<commit_message>
Changes to presentation pp and Dyn file
</commit_message>
<xml_diff>
--- a/UKDUG_Pandamo/Pandamo – Data Science for Dynamo.pptx
+++ b/UKDUG_Pandamo/Pandamo – Data Science for Dynamo.pptx
@@ -14,9 +14,9 @@
     <p:sldId id="264" r:id="rId8"/>
     <p:sldId id="266" r:id="rId9"/>
     <p:sldId id="267" r:id="rId10"/>
-    <p:sldId id="268" r:id="rId11"/>
-    <p:sldId id="269" r:id="rId12"/>
-    <p:sldId id="271" r:id="rId13"/>
+    <p:sldId id="269" r:id="rId11"/>
+    <p:sldId id="268" r:id="rId12"/>
+    <p:sldId id="272" r:id="rId13"/>
   </p:sldIdLst>
   <p:sldSz cx="12192000" cy="6858000"/>
   <p:notesSz cx="6858000" cy="9144000"/>
@@ -115,6 +115,11 @@
       </a:defRPr>
     </a:lvl9pPr>
   </p:defaultTextStyle>
+  <p:extLst>
+    <p:ext uri="{EFAFB233-063F-42B5-8137-9DF3F51BA10A}">
+      <p15:sldGuideLst xmlns:p15="http://schemas.microsoft.com/office/powerpoint/2012/main"/>
+    </p:ext>
+  </p:extLst>
 </p:presentation>
 </file>
 
@@ -267,7 +272,7 @@
           <a:p>
             <a:fld id="{64570CC6-32EE-4AA9-8F86-AF74289B2F52}" type="datetimeFigureOut">
               <a:rPr lang="en-GB" smtClean="0"/>
-              <a:t>12/09/2019</a:t>
+              <a:t>16/09/2019</a:t>
             </a:fld>
             <a:endParaRPr lang="en-GB"/>
           </a:p>
@@ -467,7 +472,7 @@
           <a:p>
             <a:fld id="{64570CC6-32EE-4AA9-8F86-AF74289B2F52}" type="datetimeFigureOut">
               <a:rPr lang="en-GB" smtClean="0"/>
-              <a:t>12/09/2019</a:t>
+              <a:t>16/09/2019</a:t>
             </a:fld>
             <a:endParaRPr lang="en-GB"/>
           </a:p>
@@ -677,7 +682,7 @@
           <a:p>
             <a:fld id="{64570CC6-32EE-4AA9-8F86-AF74289B2F52}" type="datetimeFigureOut">
               <a:rPr lang="en-GB" smtClean="0"/>
-              <a:t>12/09/2019</a:t>
+              <a:t>16/09/2019</a:t>
             </a:fld>
             <a:endParaRPr lang="en-GB"/>
           </a:p>
@@ -877,7 +882,7 @@
           <a:p>
             <a:fld id="{64570CC6-32EE-4AA9-8F86-AF74289B2F52}" type="datetimeFigureOut">
               <a:rPr lang="en-GB" smtClean="0"/>
-              <a:t>12/09/2019</a:t>
+              <a:t>16/09/2019</a:t>
             </a:fld>
             <a:endParaRPr lang="en-GB"/>
           </a:p>
@@ -1153,7 +1158,7 @@
           <a:p>
             <a:fld id="{64570CC6-32EE-4AA9-8F86-AF74289B2F52}" type="datetimeFigureOut">
               <a:rPr lang="en-GB" smtClean="0"/>
-              <a:t>12/09/2019</a:t>
+              <a:t>16/09/2019</a:t>
             </a:fld>
             <a:endParaRPr lang="en-GB"/>
           </a:p>
@@ -1421,7 +1426,7 @@
           <a:p>
             <a:fld id="{64570CC6-32EE-4AA9-8F86-AF74289B2F52}" type="datetimeFigureOut">
               <a:rPr lang="en-GB" smtClean="0"/>
-              <a:t>12/09/2019</a:t>
+              <a:t>16/09/2019</a:t>
             </a:fld>
             <a:endParaRPr lang="en-GB"/>
           </a:p>
@@ -1836,7 +1841,7 @@
           <a:p>
             <a:fld id="{64570CC6-32EE-4AA9-8F86-AF74289B2F52}" type="datetimeFigureOut">
               <a:rPr lang="en-GB" smtClean="0"/>
-              <a:t>12/09/2019</a:t>
+              <a:t>16/09/2019</a:t>
             </a:fld>
             <a:endParaRPr lang="en-GB"/>
           </a:p>
@@ -1978,7 +1983,7 @@
           <a:p>
             <a:fld id="{64570CC6-32EE-4AA9-8F86-AF74289B2F52}" type="datetimeFigureOut">
               <a:rPr lang="en-GB" smtClean="0"/>
-              <a:t>12/09/2019</a:t>
+              <a:t>16/09/2019</a:t>
             </a:fld>
             <a:endParaRPr lang="en-GB"/>
           </a:p>
@@ -2091,7 +2096,7 @@
           <a:p>
             <a:fld id="{64570CC6-32EE-4AA9-8F86-AF74289B2F52}" type="datetimeFigureOut">
               <a:rPr lang="en-GB" smtClean="0"/>
-              <a:t>12/09/2019</a:t>
+              <a:t>16/09/2019</a:t>
             </a:fld>
             <a:endParaRPr lang="en-GB"/>
           </a:p>
@@ -2404,7 +2409,7 @@
           <a:p>
             <a:fld id="{64570CC6-32EE-4AA9-8F86-AF74289B2F52}" type="datetimeFigureOut">
               <a:rPr lang="en-GB" smtClean="0"/>
-              <a:t>12/09/2019</a:t>
+              <a:t>16/09/2019</a:t>
             </a:fld>
             <a:endParaRPr lang="en-GB"/>
           </a:p>
@@ -2693,7 +2698,7 @@
           <a:p>
             <a:fld id="{64570CC6-32EE-4AA9-8F86-AF74289B2F52}" type="datetimeFigureOut">
               <a:rPr lang="en-GB" smtClean="0"/>
-              <a:t>12/09/2019</a:t>
+              <a:t>16/09/2019</a:t>
             </a:fld>
             <a:endParaRPr lang="en-GB"/>
           </a:p>
@@ -2936,7 +2941,7 @@
           <a:p>
             <a:fld id="{64570CC6-32EE-4AA9-8F86-AF74289B2F52}" type="datetimeFigureOut">
               <a:rPr lang="en-GB" smtClean="0"/>
-              <a:t>12/09/2019</a:t>
+              <a:t>16/09/2019</a:t>
             </a:fld>
             <a:endParaRPr lang="en-GB"/>
           </a:p>
@@ -3566,8 +3571,8 @@
         </p:blipFill>
         <p:spPr>
           <a:xfrm>
-            <a:off x="6019468" y="492573"/>
-            <a:ext cx="4822252" cy="5880796"/>
+            <a:off x="5682587" y="186141"/>
+            <a:ext cx="5318287" cy="6485717"/>
           </a:xfrm>
           <a:prstGeom prst="rect">
             <a:avLst/>
@@ -3612,21 +3617,21 @@
           <a:chExt cx="0" cy="0"/>
         </a:xfrm>
       </p:grpSpPr>
-      <p:sp>
-        <p:nvSpPr>
-          <p:cNvPr id="10" name="Rectangle 9">
-            <a:extLst>
-              <a:ext uri="{FF2B5EF4-FFF2-40B4-BE49-F238E27FC236}">
-                <a16:creationId xmlns:a16="http://schemas.microsoft.com/office/drawing/2014/main" id="{6753252F-4873-4F63-801D-CC719279A7D5}"/>
+      <p:cxnSp>
+        <p:nvCxnSpPr>
+          <p:cNvPr id="71" name="Straight Connector 70">
+            <a:extLst>
+              <a:ext uri="{FF2B5EF4-FFF2-40B4-BE49-F238E27FC236}">
+                <a16:creationId xmlns:a16="http://schemas.microsoft.com/office/drawing/2014/main" id="{99AE2756-0FC4-4155-83E7-58AAAB63E757}"/>
               </a:ext>
               <a:ext uri="{C183D7F6-B498-43B3-948B-1728B52AA6E4}">
                 <adec:decorative xmlns:adec="http://schemas.microsoft.com/office/drawing/2017/decorative" val="1"/>
               </a:ext>
             </a:extLst>
           </p:cNvPr>
-          <p:cNvSpPr>
-            <a:spLocks noGrp="1" noRot="1" noChangeAspect="1" noMove="1" noResize="1" noEditPoints="1" noAdjustHandles="1" noChangeArrowheads="1" noChangeShapeType="1" noTextEdit="1"/>
-          </p:cNvSpPr>
+          <p:cNvCxnSpPr>
+            <a:cxnSpLocks noGrp="1" noRot="1" noChangeAspect="1" noMove="1" noResize="1" noEditPoints="1" noAdjustHandles="1" noChangeArrowheads="1" noChangeShapeType="1"/>
+          </p:cNvCxnSpPr>
           <p:nvPr>
             <p:extLst>
               <p:ext uri="{386F3935-93C4-4BCD-93E2-E3B085C9AB24}">
@@ -3634,20 +3639,74 @@
               </p:ext>
             </p:extLst>
           </p:nvPr>
-        </p:nvSpPr>
+        </p:nvCxnSpPr>
         <p:spPr>
           <a:xfrm>
-            <a:off x="0" y="0"/>
-            <a:ext cx="12192000" cy="6858000"/>
+            <a:off x="4065689" y="477749"/>
+            <a:ext cx="0" cy="3657600"/>
+          </a:xfrm>
+          <a:prstGeom prst="line">
+            <a:avLst/>
+          </a:prstGeom>
+          <a:ln w="101600" cmpd="dbl">
+            <a:solidFill>
+              <a:srgbClr val="595959"/>
+            </a:solidFill>
+          </a:ln>
+        </p:spPr>
+        <p:style>
+          <a:lnRef idx="1">
+            <a:schemeClr val="accent1"/>
+          </a:lnRef>
+          <a:fillRef idx="0">
+            <a:schemeClr val="accent1"/>
+          </a:fillRef>
+          <a:effectRef idx="0">
+            <a:schemeClr val="accent1"/>
+          </a:effectRef>
+          <a:fontRef idx="minor">
+            <a:schemeClr val="tx1"/>
+          </a:fontRef>
+        </p:style>
+      </p:cxnSp>
+      <p:sp>
+        <p:nvSpPr>
+          <p:cNvPr id="73" name="Rectangle 72">
+            <a:extLst>
+              <a:ext uri="{FF2B5EF4-FFF2-40B4-BE49-F238E27FC236}">
+                <a16:creationId xmlns:a16="http://schemas.microsoft.com/office/drawing/2014/main" id="{247AB924-1B87-43FC-B7C7-B112D5C51A0E}"/>
+              </a:ext>
+              <a:ext uri="{C183D7F6-B498-43B3-948B-1728B52AA6E4}">
+                <adec:decorative xmlns:adec="http://schemas.microsoft.com/office/drawing/2017/decorative" val="1"/>
+              </a:ext>
+            </a:extLst>
+          </p:cNvPr>
+          <p:cNvSpPr>
+            <a:spLocks noGrp="1" noRot="1" noChangeAspect="1" noMove="1" noResize="1" noEditPoints="1" noAdjustHandles="1" noChangeArrowheads="1" noChangeShapeType="1" noTextEdit="1"/>
+          </p:cNvSpPr>
+          <p:nvPr>
+            <p:extLst>
+              <p:ext uri="{386F3935-93C4-4BCD-93E2-E3B085C9AB24}">
+                <p16:designElem xmlns:p16="http://schemas.microsoft.com/office/powerpoint/2015/main" val="1"/>
+              </p:ext>
+            </p:extLst>
+          </p:nvPr>
+        </p:nvSpPr>
+        <p:spPr bwMode="ltGray">
+          <a:xfrm>
+            <a:off x="378068" y="4633546"/>
+            <a:ext cx="11438793" cy="1844256"/>
           </a:xfrm>
           <a:prstGeom prst="rect">
             <a:avLst/>
           </a:prstGeom>
           <a:solidFill>
-            <a:srgbClr val="FFFFFF"/>
+            <a:srgbClr val="404040"/>
           </a:solidFill>
-          <a:ln>
-            <a:noFill/>
+          <a:ln w="127000" cap="sq" cmpd="thinThick">
+            <a:solidFill>
+              <a:srgbClr val="404040"/>
+            </a:solidFill>
           </a:ln>
         </p:spPr>
         <p:style>
@@ -3677,19 +3736,106 @@
       </p:sp>
       <p:sp>
         <p:nvSpPr>
-          <p:cNvPr id="12" name="Rectangle 11">
-            <a:extLst>
-              <a:ext uri="{FF2B5EF4-FFF2-40B4-BE49-F238E27FC236}">
-                <a16:creationId xmlns:a16="http://schemas.microsoft.com/office/drawing/2014/main" id="{047C8CCB-F95D-4249-92DD-651249D3535A}"/>
+          <p:cNvPr id="2" name="Title 1">
+            <a:extLst>
+              <a:ext uri="{FF2B5EF4-FFF2-40B4-BE49-F238E27FC236}">
+                <a16:creationId xmlns:a16="http://schemas.microsoft.com/office/drawing/2014/main" id="{FAD1AF4B-FCC4-4F95-8C73-33961E84A300}"/>
+              </a:ext>
+            </a:extLst>
+          </p:cNvPr>
+          <p:cNvSpPr>
+            <a:spLocks noGrp="1"/>
+          </p:cNvSpPr>
+          <p:nvPr>
+            <p:ph type="title"/>
+          </p:nvPr>
+        </p:nvSpPr>
+        <p:spPr>
+          <a:xfrm>
+            <a:off x="527538" y="4756638"/>
+            <a:ext cx="11139854" cy="930447"/>
+          </a:xfrm>
+        </p:spPr>
+        <p:txBody>
+          <a:bodyPr vert="horz" lIns="91440" tIns="45720" rIns="91440" bIns="45720" rtlCol="0" anchor="b">
+            <a:normAutofit/>
+          </a:bodyPr>
+          <a:lstStyle/>
+          <a:p>
+            <a:pPr algn="ctr"/>
+            <a:r>
+              <a:rPr lang="en-US" sz="5400">
+                <a:solidFill>
+                  <a:srgbClr val="FFFFFF"/>
+                </a:solidFill>
+              </a:rPr>
+              <a:t>Limitations of Dynamo</a:t>
+            </a:r>
+          </a:p>
+        </p:txBody>
+      </p:sp>
+      <p:pic>
+        <p:nvPicPr>
+          <p:cNvPr id="4098" name="Picture 2" descr="Billedresultat for ironpython">
+            <a:extLst>
+              <a:ext uri="{FF2B5EF4-FFF2-40B4-BE49-F238E27FC236}">
+                <a16:creationId xmlns:a16="http://schemas.microsoft.com/office/drawing/2014/main" id="{D2207F17-E0C7-414F-8858-CDA097488726}"/>
+              </a:ext>
+            </a:extLst>
+          </p:cNvPr>
+          <p:cNvPicPr>
+            <a:picLocks noGrp="1" noChangeAspect="1" noChangeArrowheads="1"/>
+          </p:cNvPicPr>
+          <p:nvPr>
+            <p:ph idx="1"/>
+          </p:nvPr>
+        </p:nvPicPr>
+        <p:blipFill rotWithShape="1">
+          <a:blip r:embed="rId2">
+            <a:extLst>
+              <a:ext uri="{28A0092B-C50C-407E-A947-70E740481C1C}">
+                <a14:useLocalDpi xmlns:a14="http://schemas.microsoft.com/office/drawing/2010/main" val="0"/>
+              </a:ext>
+            </a:extLst>
+          </a:blip>
+          <a:srcRect l="16178" t="17170" r="15536" b="8867"/>
+          <a:stretch/>
+        </p:blipFill>
+        <p:spPr bwMode="auto">
+          <a:xfrm>
+            <a:off x="8487748" y="969899"/>
+            <a:ext cx="3425609" cy="2782799"/>
+          </a:xfrm>
+          <a:prstGeom prst="rect">
+            <a:avLst/>
+          </a:prstGeom>
+          <a:noFill/>
+          <a:extLst>
+            <a:ext uri="{909E8E84-426E-40DD-AFC4-6F175D3DCCD1}">
+              <a14:hiddenFill xmlns:a14="http://schemas.microsoft.com/office/drawing/2010/main">
+                <a:solidFill>
+                  <a:srgbClr val="FFFFFF"/>
+                </a:solidFill>
+              </a14:hiddenFill>
+            </a:ext>
+          </a:extLst>
+        </p:spPr>
+      </p:pic>
+      <p:cxnSp>
+        <p:nvCxnSpPr>
+          <p:cNvPr id="75" name="Straight Connector 74">
+            <a:extLst>
+              <a:ext uri="{FF2B5EF4-FFF2-40B4-BE49-F238E27FC236}">
+                <a16:creationId xmlns:a16="http://schemas.microsoft.com/office/drawing/2014/main" id="{818DC98F-4057-4645-B948-F604F39A9CFE}"/>
               </a:ext>
               <a:ext uri="{C183D7F6-B498-43B3-948B-1728B52AA6E4}">
                 <adec:decorative xmlns:adec="http://schemas.microsoft.com/office/drawing/2017/decorative" val="1"/>
               </a:ext>
             </a:extLst>
           </p:cNvPr>
-          <p:cNvSpPr>
-            <a:spLocks noGrp="1" noRot="1" noChangeAspect="1" noMove="1" noResize="1" noEditPoints="1" noAdjustHandles="1" noChangeArrowheads="1" noChangeShapeType="1" noTextEdit="1"/>
-          </p:cNvSpPr>
+          <p:cNvCxnSpPr>
+            <a:cxnSpLocks noGrp="1" noRot="1" noChangeAspect="1" noMove="1" noResize="1" noEditPoints="1" noAdjustHandles="1" noChangeArrowheads="1" noChangeShapeType="1"/>
+          </p:cNvCxnSpPr>
           <p:nvPr>
             <p:extLst>
               <p:ext uri="{386F3935-93C4-4BCD-93E2-E3B085C9AB24}">
@@ -3697,119 +3843,52 @@
               </p:ext>
             </p:extLst>
           </p:nvPr>
-        </p:nvSpPr>
+        </p:nvCxnSpPr>
         <p:spPr>
           <a:xfrm>
-            <a:off x="0" y="0"/>
-            <a:ext cx="2013557" cy="6858000"/>
-          </a:xfrm>
-          <a:prstGeom prst="rect">
+            <a:off x="8153400" y="477749"/>
+            <a:ext cx="0" cy="3657600"/>
+          </a:xfrm>
+          <a:prstGeom prst="line">
             <a:avLst/>
           </a:prstGeom>
-          <a:solidFill>
-            <a:srgbClr val="7F7F7F"/>
-          </a:solidFill>
-          <a:ln>
-            <a:noFill/>
+          <a:ln w="101600" cmpd="dbl">
+            <a:solidFill>
+              <a:srgbClr val="595959"/>
+            </a:solidFill>
           </a:ln>
         </p:spPr>
         <p:style>
-          <a:lnRef idx="2">
-            <a:schemeClr val="accent1">
-              <a:shade val="50000"/>
-            </a:schemeClr>
+          <a:lnRef idx="1">
+            <a:schemeClr val="accent1"/>
           </a:lnRef>
-          <a:fillRef idx="1">
+          <a:fillRef idx="0">
             <a:schemeClr val="accent1"/>
           </a:fillRef>
           <a:effectRef idx="0">
             <a:schemeClr val="accent1"/>
           </a:effectRef>
           <a:fontRef idx="minor">
-            <a:schemeClr val="lt1"/>
+            <a:schemeClr val="tx1"/>
           </a:fontRef>
         </p:style>
-        <p:txBody>
-          <a:bodyPr rtlCol="0" anchor="ctr"/>
-          <a:lstStyle/>
-          <a:p>
-            <a:pPr algn="ctr"/>
-            <a:endParaRPr lang="en-US"/>
-          </a:p>
-        </p:txBody>
-      </p:sp>
-      <p:sp>
-        <p:nvSpPr>
-          <p:cNvPr id="2" name="Title 1">
-            <a:extLst>
-              <a:ext uri="{FF2B5EF4-FFF2-40B4-BE49-F238E27FC236}">
-                <a16:creationId xmlns:a16="http://schemas.microsoft.com/office/drawing/2014/main" id="{C21889B7-ECE5-44DA-90C8-AD55716DEFB7}"/>
-              </a:ext>
-            </a:extLst>
-          </p:cNvPr>
-          <p:cNvSpPr>
-            <a:spLocks noGrp="1"/>
-          </p:cNvSpPr>
-          <p:nvPr>
-            <p:ph type="title"/>
-          </p:nvPr>
-        </p:nvSpPr>
-        <p:spPr>
-          <a:xfrm>
-            <a:off x="640080" y="2074363"/>
-            <a:ext cx="2752354" cy="2709275"/>
-          </a:xfrm>
-          <a:prstGeom prst="ellipse">
-            <a:avLst/>
-          </a:prstGeom>
-          <a:solidFill>
-            <a:srgbClr val="262626"/>
-          </a:solidFill>
-          <a:ln w="174625" cmpd="thinThick">
-            <a:solidFill>
-              <a:srgbClr val="262626"/>
-            </a:solidFill>
-          </a:ln>
-        </p:spPr>
-        <p:txBody>
-          <a:bodyPr vert="horz" lIns="91440" tIns="45720" rIns="91440" bIns="45720" rtlCol="0" anchor="ctr">
-            <a:normAutofit/>
-          </a:bodyPr>
-          <a:lstStyle/>
-          <a:p>
-            <a:pPr algn="ctr"/>
-            <a:r>
-              <a:rPr lang="en-US" sz="2600" kern="1200" dirty="0">
-                <a:solidFill>
-                  <a:srgbClr val="FFFFFF"/>
-                </a:solidFill>
-                <a:latin typeface="+mj-lt"/>
-                <a:ea typeface="+mj-ea"/>
-                <a:cs typeface="+mj-cs"/>
-              </a:rPr>
-              <a:t>Pandas for Dynamo</a:t>
-            </a:r>
-          </a:p>
-        </p:txBody>
-      </p:sp>
+      </p:cxnSp>
       <p:pic>
         <p:nvPicPr>
-          <p:cNvPr id="5" name="Content Placeholder 4" descr="A screenshot of a computer&#10;&#10;Description automatically generated">
-            <a:extLst>
-              <a:ext uri="{FF2B5EF4-FFF2-40B4-BE49-F238E27FC236}">
-                <a16:creationId xmlns:a16="http://schemas.microsoft.com/office/drawing/2014/main" id="{EA11E6A9-AFED-427C-BBFE-E53F6FCFA3D2}"/>
+          <p:cNvPr id="5" name="Picture 4" descr="A screenshot of a cell phone&#10;&#10;Description automatically generated">
+            <a:extLst>
+              <a:ext uri="{FF2B5EF4-FFF2-40B4-BE49-F238E27FC236}">
+                <a16:creationId xmlns:a16="http://schemas.microsoft.com/office/drawing/2014/main" id="{C39D0EE0-8FDE-451C-8BB2-F2FF97C243F0}"/>
               </a:ext>
             </a:extLst>
           </p:cNvPr>
           <p:cNvPicPr>
-            <a:picLocks noGrp="1" noChangeAspect="1"/>
+            <a:picLocks noChangeAspect="1"/>
           </p:cNvPicPr>
-          <p:nvPr>
-            <p:ph idx="1"/>
-          </p:nvPr>
+          <p:nvPr/>
         </p:nvPicPr>
         <p:blipFill>
-          <a:blip r:embed="rId2">
+          <a:blip r:embed="rId3">
             <a:extLst>
               <a:ext uri="{28A0092B-C50C-407E-A947-70E740481C1C}">
                 <a14:useLocalDpi xmlns:a14="http://schemas.microsoft.com/office/drawing/2010/main" val="0"/>
@@ -3822,20 +3901,72 @@
         </p:blipFill>
         <p:spPr>
           <a:xfrm>
-            <a:off x="3690790" y="913439"/>
-            <a:ext cx="7861130" cy="5031122"/>
+            <a:off x="357323" y="587250"/>
+            <a:ext cx="3423916" cy="3548099"/>
           </a:xfrm>
           <a:prstGeom prst="rect">
             <a:avLst/>
           </a:prstGeom>
         </p:spPr>
       </p:pic>
+      <p:cxnSp>
+        <p:nvCxnSpPr>
+          <p:cNvPr id="77" name="Straight Connector 76">
+            <a:extLst>
+              <a:ext uri="{FF2B5EF4-FFF2-40B4-BE49-F238E27FC236}">
+                <a16:creationId xmlns:a16="http://schemas.microsoft.com/office/drawing/2014/main" id="{DAD2B705-4A9B-408D-AA80-4F41045E09DE}"/>
+              </a:ext>
+              <a:ext uri="{C183D7F6-B498-43B3-948B-1728B52AA6E4}">
+                <adec:decorative xmlns:adec="http://schemas.microsoft.com/office/drawing/2017/decorative" val="1"/>
+              </a:ext>
+            </a:extLst>
+          </p:cNvPr>
+          <p:cNvCxnSpPr>
+            <a:cxnSpLocks noGrp="1" noRot="1" noChangeAspect="1" noMove="1" noResize="1" noEditPoints="1" noAdjustHandles="1" noChangeArrowheads="1" noChangeShapeType="1"/>
+          </p:cNvCxnSpPr>
+          <p:nvPr>
+            <p:extLst>
+              <p:ext uri="{386F3935-93C4-4BCD-93E2-E3B085C9AB24}">
+                <p16:designElem xmlns:p16="http://schemas.microsoft.com/office/powerpoint/2015/main" val="1"/>
+              </p:ext>
+            </p:extLst>
+          </p:nvPr>
+        </p:nvCxnSpPr>
+        <p:spPr>
+          <a:xfrm>
+            <a:off x="2209800" y="5738691"/>
+            <a:ext cx="7772400" cy="0"/>
+          </a:xfrm>
+          <a:prstGeom prst="line">
+            <a:avLst/>
+          </a:prstGeom>
+          <a:ln w="22225">
+            <a:solidFill>
+              <a:srgbClr val="D9D9D9"/>
+            </a:solidFill>
+          </a:ln>
+        </p:spPr>
+        <p:style>
+          <a:lnRef idx="1">
+            <a:schemeClr val="accent1"/>
+          </a:lnRef>
+          <a:fillRef idx="0">
+            <a:schemeClr val="accent1"/>
+          </a:fillRef>
+          <a:effectRef idx="0">
+            <a:schemeClr val="accent1"/>
+          </a:effectRef>
+          <a:fontRef idx="minor">
+            <a:schemeClr val="tx1"/>
+          </a:fontRef>
+        </p:style>
+      </p:cxnSp>
       <p:pic>
         <p:nvPicPr>
-          <p:cNvPr id="8" name="Content Placeholder 4">
-            <a:extLst>
-              <a:ext uri="{FF2B5EF4-FFF2-40B4-BE49-F238E27FC236}">
-                <a16:creationId xmlns:a16="http://schemas.microsoft.com/office/drawing/2014/main" id="{88980F0B-F55E-44BC-AF46-4F64349B39E8}"/>
+          <p:cNvPr id="8" name="Picture 7">
+            <a:extLst>
+              <a:ext uri="{FF2B5EF4-FFF2-40B4-BE49-F238E27FC236}">
+                <a16:creationId xmlns:a16="http://schemas.microsoft.com/office/drawing/2014/main" id="{4AC35D0C-7753-4B18-B689-D92E33928239}"/>
               </a:ext>
             </a:extLst>
           </p:cNvPr>
@@ -3844,126 +3975,112 @@
           </p:cNvPicPr>
           <p:nvPr/>
         </p:nvPicPr>
-        <p:blipFill rotWithShape="1">
-          <a:blip r:embed="rId3">
-            <a:extLst>
-              <a:ext uri="{28A0092B-C50C-407E-A947-70E740481C1C}">
-                <a14:useLocalDpi xmlns:a14="http://schemas.microsoft.com/office/drawing/2010/main" val="0"/>
-              </a:ext>
-            </a:extLst>
-          </a:blip>
-          <a:srcRect t="6174" r="17180" b="18769"/>
-          <a:stretch/>
+        <p:blipFill>
+          <a:blip r:embed="rId4"/>
+          <a:stretch>
+            <a:fillRect/>
+          </a:stretch>
         </p:blipFill>
         <p:spPr>
           <a:xfrm>
-            <a:off x="640080" y="2020711"/>
-            <a:ext cx="2272453" cy="2511535"/>
+            <a:off x="4350140" y="1086199"/>
+            <a:ext cx="3585920" cy="2342801"/>
           </a:xfrm>
           <a:prstGeom prst="rect">
             <a:avLst/>
           </a:prstGeom>
         </p:spPr>
       </p:pic>
-      <p:sp>
-        <p:nvSpPr>
-          <p:cNvPr id="13" name="Rectangle 12">
-            <a:extLst>
-              <a:ext uri="{FF2B5EF4-FFF2-40B4-BE49-F238E27FC236}">
-                <a16:creationId xmlns:a16="http://schemas.microsoft.com/office/drawing/2014/main" id="{D7A51F48-EDCF-4FB8-8122-DB38C94C2B86}"/>
-              </a:ext>
-            </a:extLst>
-          </p:cNvPr>
-          <p:cNvSpPr/>
+      <p:cxnSp>
+        <p:nvCxnSpPr>
+          <p:cNvPr id="10" name="Straight Connector 9">
+            <a:extLst>
+              <a:ext uri="{FF2B5EF4-FFF2-40B4-BE49-F238E27FC236}">
+                <a16:creationId xmlns:a16="http://schemas.microsoft.com/office/drawing/2014/main" id="{6A93249A-C510-404B-89C0-DA49D7114067}"/>
+              </a:ext>
+            </a:extLst>
+          </p:cNvPr>
+          <p:cNvCxnSpPr>
+            <a:cxnSpLocks/>
+          </p:cNvCxnSpPr>
           <p:nvPr/>
-        </p:nvSpPr>
+        </p:nvCxnSpPr>
         <p:spPr>
           <a:xfrm>
-            <a:off x="354564" y="4288100"/>
-            <a:ext cx="3587073" cy="952257"/>
-          </a:xfrm>
-          <a:prstGeom prst="rect">
+            <a:off x="8991600" y="762000"/>
+            <a:ext cx="2921757" cy="2336800"/>
+          </a:xfrm>
+          <a:prstGeom prst="line">
             <a:avLst/>
           </a:prstGeom>
-          <a:noFill/>
-        </p:spPr>
-        <p:txBody>
-          <a:bodyPr wrap="none" lIns="91440" tIns="45720" rIns="91440" bIns="45720">
-            <a:prstTxWarp prst="textArchDown">
-              <a:avLst>
-                <a:gd name="adj" fmla="val 526117"/>
-              </a:avLst>
-            </a:prstTxWarp>
-            <a:spAutoFit/>
-          </a:bodyPr>
-          <a:lstStyle/>
-          <a:p>
-            <a:pPr algn="ctr"/>
-            <a:r>
-              <a:rPr lang="en-US" sz="5400" b="0" cap="none" spc="0" dirty="0">
-                <a:ln w="0"/>
-                <a:solidFill>
-                  <a:schemeClr val="tx1"/>
-                </a:solidFill>
-                <a:effectLst>
-                  <a:outerShdw blurRad="38100" dist="19050" dir="2700000" algn="tl" rotWithShape="0">
-                    <a:schemeClr val="dk1">
-                      <a:alpha val="40000"/>
-                    </a:schemeClr>
-                  </a:outerShdw>
-                </a:effectLst>
-              </a:rPr>
-              <a:t>Pandas for Dynamo</a:t>
-            </a:r>
-          </a:p>
-        </p:txBody>
-      </p:sp>
-      <p:sp>
-        <p:nvSpPr>
-          <p:cNvPr id="14" name="TextBox 13">
-            <a:extLst>
-              <a:ext uri="{FF2B5EF4-FFF2-40B4-BE49-F238E27FC236}">
-                <a16:creationId xmlns:a16="http://schemas.microsoft.com/office/drawing/2014/main" id="{069505C8-83C4-4059-AA9C-916369221D61}"/>
-              </a:ext>
-            </a:extLst>
-          </p:cNvPr>
-          <p:cNvSpPr txBox="1"/>
+          <a:ln w="38100">
+            <a:solidFill>
+              <a:srgbClr val="FF0000"/>
+            </a:solidFill>
+          </a:ln>
+        </p:spPr>
+        <p:style>
+          <a:lnRef idx="1">
+            <a:schemeClr val="accent1"/>
+          </a:lnRef>
+          <a:fillRef idx="0">
+            <a:schemeClr val="accent1"/>
+          </a:fillRef>
+          <a:effectRef idx="0">
+            <a:schemeClr val="accent1"/>
+          </a:effectRef>
+          <a:fontRef idx="minor">
+            <a:schemeClr val="tx1"/>
+          </a:fontRef>
+        </p:style>
+      </p:cxnSp>
+      <p:cxnSp>
+        <p:nvCxnSpPr>
+          <p:cNvPr id="12" name="Straight Connector 11">
+            <a:extLst>
+              <a:ext uri="{FF2B5EF4-FFF2-40B4-BE49-F238E27FC236}">
+                <a16:creationId xmlns:a16="http://schemas.microsoft.com/office/drawing/2014/main" id="{FA73CE84-61E9-451D-BB18-1763C7E030B7}"/>
+              </a:ext>
+            </a:extLst>
+          </p:cNvPr>
+          <p:cNvCxnSpPr>
+            <a:cxnSpLocks/>
+          </p:cNvCxnSpPr>
           <p:nvPr/>
-        </p:nvSpPr>
+        </p:nvCxnSpPr>
         <p:spPr>
-          <a:xfrm>
-            <a:off x="6972069" y="4917191"/>
-            <a:ext cx="4833258" cy="646331"/>
-          </a:xfrm>
-          <a:prstGeom prst="rect">
+          <a:xfrm flipH="1">
+            <a:off x="8991600" y="800100"/>
+            <a:ext cx="2921757" cy="2224622"/>
+          </a:xfrm>
+          <a:prstGeom prst="line">
             <a:avLst/>
           </a:prstGeom>
-          <a:noFill/>
-        </p:spPr>
-        <p:txBody>
-          <a:bodyPr wrap="square" rtlCol="0">
-            <a:spAutoFit/>
-          </a:bodyPr>
-          <a:lstStyle/>
-          <a:p>
-            <a:r>
-              <a:rPr lang="en-US" dirty="0"/>
-              <a:t>49 nodes – broken down by 10 categories</a:t>
-            </a:r>
-          </a:p>
-          <a:p>
-            <a:r>
-              <a:rPr lang="en-US" dirty="0"/>
-              <a:t>1 view extension to connect Dynamo with Python</a:t>
-            </a:r>
-            <a:endParaRPr lang="en-GB" dirty="0"/>
-          </a:p>
-        </p:txBody>
-      </p:sp>
+          <a:ln w="38100">
+            <a:solidFill>
+              <a:srgbClr val="FF0000"/>
+            </a:solidFill>
+          </a:ln>
+        </p:spPr>
+        <p:style>
+          <a:lnRef idx="1">
+            <a:schemeClr val="accent1"/>
+          </a:lnRef>
+          <a:fillRef idx="0">
+            <a:schemeClr val="accent1"/>
+          </a:fillRef>
+          <a:effectRef idx="0">
+            <a:schemeClr val="accent1"/>
+          </a:effectRef>
+          <a:fontRef idx="minor">
+            <a:schemeClr val="tx1"/>
+          </a:fontRef>
+        </p:style>
+      </p:cxnSp>
     </p:spTree>
     <p:extLst>
       <p:ext uri="{BB962C8B-B14F-4D97-AF65-F5344CB8AC3E}">
-        <p14:creationId xmlns:p14="http://schemas.microsoft.com/office/powerpoint/2010/main" val="956590231"/>
+        <p14:creationId xmlns:p14="http://schemas.microsoft.com/office/powerpoint/2010/main" val="631925738"/>
       </p:ext>
     </p:extLst>
   </p:cSld>
@@ -3998,21 +4115,21 @@
           <a:chExt cx="0" cy="0"/>
         </a:xfrm>
       </p:grpSpPr>
-      <p:cxnSp>
-        <p:nvCxnSpPr>
-          <p:cNvPr id="71" name="Straight Connector 70">
-            <a:extLst>
-              <a:ext uri="{FF2B5EF4-FFF2-40B4-BE49-F238E27FC236}">
-                <a16:creationId xmlns:a16="http://schemas.microsoft.com/office/drawing/2014/main" id="{99AE2756-0FC4-4155-83E7-58AAAB63E757}"/>
+      <p:sp>
+        <p:nvSpPr>
+          <p:cNvPr id="10" name="Rectangle 9">
+            <a:extLst>
+              <a:ext uri="{FF2B5EF4-FFF2-40B4-BE49-F238E27FC236}">
+                <a16:creationId xmlns:a16="http://schemas.microsoft.com/office/drawing/2014/main" id="{6753252F-4873-4F63-801D-CC719279A7D5}"/>
               </a:ext>
               <a:ext uri="{C183D7F6-B498-43B3-948B-1728B52AA6E4}">
                 <adec:decorative xmlns:adec="http://schemas.microsoft.com/office/drawing/2017/decorative" val="1"/>
               </a:ext>
             </a:extLst>
           </p:cNvPr>
-          <p:cNvCxnSpPr>
-            <a:cxnSpLocks noGrp="1" noRot="1" noChangeAspect="1" noMove="1" noResize="1" noEditPoints="1" noAdjustHandles="1" noChangeArrowheads="1" noChangeShapeType="1"/>
-          </p:cNvCxnSpPr>
+          <p:cNvSpPr>
+            <a:spLocks noGrp="1" noRot="1" noChangeAspect="1" noMove="1" noResize="1" noEditPoints="1" noAdjustHandles="1" noChangeArrowheads="1" noChangeShapeType="1" noTextEdit="1"/>
+          </p:cNvSpPr>
           <p:nvPr>
             <p:extLst>
               <p:ext uri="{386F3935-93C4-4BCD-93E2-E3B085C9AB24}">
@@ -4020,74 +4137,20 @@
               </p:ext>
             </p:extLst>
           </p:nvPr>
-        </p:nvCxnSpPr>
+        </p:nvSpPr>
         <p:spPr>
           <a:xfrm>
-            <a:off x="4065689" y="477749"/>
-            <a:ext cx="0" cy="3657600"/>
-          </a:xfrm>
-          <a:prstGeom prst="line">
-            <a:avLst/>
-          </a:prstGeom>
-          <a:ln w="101600" cmpd="dbl">
-            <a:solidFill>
-              <a:srgbClr val="595959"/>
-            </a:solidFill>
-          </a:ln>
-        </p:spPr>
-        <p:style>
-          <a:lnRef idx="1">
-            <a:schemeClr val="accent1"/>
-          </a:lnRef>
-          <a:fillRef idx="0">
-            <a:schemeClr val="accent1"/>
-          </a:fillRef>
-          <a:effectRef idx="0">
-            <a:schemeClr val="accent1"/>
-          </a:effectRef>
-          <a:fontRef idx="minor">
-            <a:schemeClr val="tx1"/>
-          </a:fontRef>
-        </p:style>
-      </p:cxnSp>
-      <p:sp>
-        <p:nvSpPr>
-          <p:cNvPr id="73" name="Rectangle 72">
-            <a:extLst>
-              <a:ext uri="{FF2B5EF4-FFF2-40B4-BE49-F238E27FC236}">
-                <a16:creationId xmlns:a16="http://schemas.microsoft.com/office/drawing/2014/main" id="{247AB924-1B87-43FC-B7C7-B112D5C51A0E}"/>
-              </a:ext>
-              <a:ext uri="{C183D7F6-B498-43B3-948B-1728B52AA6E4}">
-                <adec:decorative xmlns:adec="http://schemas.microsoft.com/office/drawing/2017/decorative" val="1"/>
-              </a:ext>
-            </a:extLst>
-          </p:cNvPr>
-          <p:cNvSpPr>
-            <a:spLocks noGrp="1" noRot="1" noChangeAspect="1" noMove="1" noResize="1" noEditPoints="1" noAdjustHandles="1" noChangeArrowheads="1" noChangeShapeType="1" noTextEdit="1"/>
-          </p:cNvSpPr>
-          <p:nvPr>
-            <p:extLst>
-              <p:ext uri="{386F3935-93C4-4BCD-93E2-E3B085C9AB24}">
-                <p16:designElem xmlns:p16="http://schemas.microsoft.com/office/powerpoint/2015/main" val="1"/>
-              </p:ext>
-            </p:extLst>
-          </p:nvPr>
-        </p:nvSpPr>
-        <p:spPr bwMode="ltGray">
-          <a:xfrm>
-            <a:off x="378068" y="4633546"/>
-            <a:ext cx="11438793" cy="1844256"/>
+            <a:off x="0" y="0"/>
+            <a:ext cx="12192000" cy="6858000"/>
           </a:xfrm>
           <a:prstGeom prst="rect">
             <a:avLst/>
           </a:prstGeom>
           <a:solidFill>
-            <a:srgbClr val="404040"/>
+            <a:srgbClr val="FFFFFF"/>
           </a:solidFill>
-          <a:ln w="127000" cap="sq" cmpd="thinThick">
-            <a:solidFill>
-              <a:srgbClr val="404040"/>
-            </a:solidFill>
+          <a:ln>
+            <a:noFill/>
           </a:ln>
         </p:spPr>
         <p:style>
@@ -4117,50 +4180,419 @@
       </p:sp>
       <p:sp>
         <p:nvSpPr>
-          <p:cNvPr id="2" name="Title 1">
-            <a:extLst>
-              <a:ext uri="{FF2B5EF4-FFF2-40B4-BE49-F238E27FC236}">
-                <a16:creationId xmlns:a16="http://schemas.microsoft.com/office/drawing/2014/main" id="{FAD1AF4B-FCC4-4F95-8C73-33961E84A300}"/>
-              </a:ext>
-            </a:extLst>
-          </p:cNvPr>
-          <p:cNvSpPr>
-            <a:spLocks noGrp="1"/>
-          </p:cNvSpPr>
-          <p:nvPr>
-            <p:ph type="title"/>
+          <p:cNvPr id="12" name="Rectangle 11">
+            <a:extLst>
+              <a:ext uri="{FF2B5EF4-FFF2-40B4-BE49-F238E27FC236}">
+                <a16:creationId xmlns:a16="http://schemas.microsoft.com/office/drawing/2014/main" id="{047C8CCB-F95D-4249-92DD-651249D3535A}"/>
+              </a:ext>
+              <a:ext uri="{C183D7F6-B498-43B3-948B-1728B52AA6E4}">
+                <adec:decorative xmlns:adec="http://schemas.microsoft.com/office/drawing/2017/decorative" val="1"/>
+              </a:ext>
+            </a:extLst>
+          </p:cNvPr>
+          <p:cNvSpPr>
+            <a:spLocks noGrp="1" noRot="1" noChangeAspect="1" noMove="1" noResize="1" noEditPoints="1" noAdjustHandles="1" noChangeArrowheads="1" noChangeShapeType="1" noTextEdit="1"/>
+          </p:cNvSpPr>
+          <p:nvPr>
+            <p:extLst>
+              <p:ext uri="{386F3935-93C4-4BCD-93E2-E3B085C9AB24}">
+                <p16:designElem xmlns:p16="http://schemas.microsoft.com/office/powerpoint/2015/main" val="1"/>
+              </p:ext>
+            </p:extLst>
           </p:nvPr>
         </p:nvSpPr>
         <p:spPr>
           <a:xfrm>
-            <a:off x="527538" y="4756638"/>
-            <a:ext cx="11139854" cy="930447"/>
-          </a:xfrm>
-        </p:spPr>
-        <p:txBody>
-          <a:bodyPr vert="horz" lIns="91440" tIns="45720" rIns="91440" bIns="45720" rtlCol="0" anchor="b">
+            <a:off x="0" y="0"/>
+            <a:ext cx="2013557" cy="6858000"/>
+          </a:xfrm>
+          <a:prstGeom prst="rect">
+            <a:avLst/>
+          </a:prstGeom>
+          <a:solidFill>
+            <a:srgbClr val="7F7F7F"/>
+          </a:solidFill>
+          <a:ln>
+            <a:noFill/>
+          </a:ln>
+        </p:spPr>
+        <p:style>
+          <a:lnRef idx="2">
+            <a:schemeClr val="accent1">
+              <a:shade val="50000"/>
+            </a:schemeClr>
+          </a:lnRef>
+          <a:fillRef idx="1">
+            <a:schemeClr val="accent1"/>
+          </a:fillRef>
+          <a:effectRef idx="0">
+            <a:schemeClr val="accent1"/>
+          </a:effectRef>
+          <a:fontRef idx="minor">
+            <a:schemeClr val="lt1"/>
+          </a:fontRef>
+        </p:style>
+        <p:txBody>
+          <a:bodyPr rtlCol="0" anchor="ctr"/>
+          <a:lstStyle/>
+          <a:p>
+            <a:pPr algn="ctr"/>
+            <a:endParaRPr lang="en-US"/>
+          </a:p>
+        </p:txBody>
+      </p:sp>
+      <p:sp>
+        <p:nvSpPr>
+          <p:cNvPr id="2" name="Title 1">
+            <a:extLst>
+              <a:ext uri="{FF2B5EF4-FFF2-40B4-BE49-F238E27FC236}">
+                <a16:creationId xmlns:a16="http://schemas.microsoft.com/office/drawing/2014/main" id="{C21889B7-ECE5-44DA-90C8-AD55716DEFB7}"/>
+              </a:ext>
+            </a:extLst>
+          </p:cNvPr>
+          <p:cNvSpPr>
+            <a:spLocks noGrp="1"/>
+          </p:cNvSpPr>
+          <p:nvPr>
+            <p:ph type="title"/>
+          </p:nvPr>
+        </p:nvSpPr>
+        <p:spPr>
+          <a:xfrm>
+            <a:off x="640080" y="2074363"/>
+            <a:ext cx="2752354" cy="2709275"/>
+          </a:xfrm>
+          <a:prstGeom prst="ellipse">
+            <a:avLst/>
+          </a:prstGeom>
+          <a:solidFill>
+            <a:srgbClr val="262626"/>
+          </a:solidFill>
+          <a:ln w="174625" cmpd="thinThick">
+            <a:solidFill>
+              <a:srgbClr val="262626"/>
+            </a:solidFill>
+          </a:ln>
+        </p:spPr>
+        <p:txBody>
+          <a:bodyPr vert="horz" lIns="91440" tIns="45720" rIns="91440" bIns="45720" rtlCol="0" anchor="ctr">
             <a:normAutofit/>
           </a:bodyPr>
           <a:lstStyle/>
           <a:p>
             <a:pPr algn="ctr"/>
             <a:r>
-              <a:rPr lang="en-US" sz="5400">
+              <a:rPr lang="en-US" sz="2600" kern="1200" dirty="0">
                 <a:solidFill>
                   <a:srgbClr val="FFFFFF"/>
                 </a:solidFill>
+                <a:latin typeface="+mj-lt"/>
+                <a:ea typeface="+mj-ea"/>
+                <a:cs typeface="+mj-cs"/>
               </a:rPr>
-              <a:t>Limitations of Dynamo</a:t>
+              <a:t>Pandas for Dynamo</a:t>
             </a:r>
           </a:p>
         </p:txBody>
       </p:sp>
       <p:pic>
         <p:nvPicPr>
-          <p:cNvPr id="4098" name="Picture 2" descr="Billedresultat for ironpython">
-            <a:extLst>
-              <a:ext uri="{FF2B5EF4-FFF2-40B4-BE49-F238E27FC236}">
-                <a16:creationId xmlns:a16="http://schemas.microsoft.com/office/drawing/2014/main" id="{D2207F17-E0C7-414F-8858-CDA097488726}"/>
+          <p:cNvPr id="5" name="Content Placeholder 4" descr="A screenshot of a computer&#10;&#10;Description automatically generated">
+            <a:extLst>
+              <a:ext uri="{FF2B5EF4-FFF2-40B4-BE49-F238E27FC236}">
+                <a16:creationId xmlns:a16="http://schemas.microsoft.com/office/drawing/2014/main" id="{EA11E6A9-AFED-427C-BBFE-E53F6FCFA3D2}"/>
+              </a:ext>
+            </a:extLst>
+          </p:cNvPr>
+          <p:cNvPicPr>
+            <a:picLocks noGrp="1" noChangeAspect="1"/>
+          </p:cNvPicPr>
+          <p:nvPr>
+            <p:ph idx="1"/>
+          </p:nvPr>
+        </p:nvPicPr>
+        <p:blipFill>
+          <a:blip r:embed="rId2">
+            <a:extLst>
+              <a:ext uri="{28A0092B-C50C-407E-A947-70E740481C1C}">
+                <a14:useLocalDpi xmlns:a14="http://schemas.microsoft.com/office/drawing/2010/main" val="0"/>
+              </a:ext>
+            </a:extLst>
+          </a:blip>
+          <a:stretch>
+            <a:fillRect/>
+          </a:stretch>
+        </p:blipFill>
+        <p:spPr>
+          <a:xfrm>
+            <a:off x="3690790" y="913439"/>
+            <a:ext cx="7861130" cy="5031122"/>
+          </a:xfrm>
+          <a:prstGeom prst="rect">
+            <a:avLst/>
+          </a:prstGeom>
+        </p:spPr>
+      </p:pic>
+      <p:pic>
+        <p:nvPicPr>
+          <p:cNvPr id="8" name="Content Placeholder 4">
+            <a:extLst>
+              <a:ext uri="{FF2B5EF4-FFF2-40B4-BE49-F238E27FC236}">
+                <a16:creationId xmlns:a16="http://schemas.microsoft.com/office/drawing/2014/main" id="{88980F0B-F55E-44BC-AF46-4F64349B39E8}"/>
+              </a:ext>
+            </a:extLst>
+          </p:cNvPr>
+          <p:cNvPicPr>
+            <a:picLocks noChangeAspect="1"/>
+          </p:cNvPicPr>
+          <p:nvPr/>
+        </p:nvPicPr>
+        <p:blipFill rotWithShape="1">
+          <a:blip r:embed="rId3">
+            <a:extLst>
+              <a:ext uri="{28A0092B-C50C-407E-A947-70E740481C1C}">
+                <a14:useLocalDpi xmlns:a14="http://schemas.microsoft.com/office/drawing/2010/main" val="0"/>
+              </a:ext>
+            </a:extLst>
+          </a:blip>
+          <a:srcRect t="6174" r="17180" b="18769"/>
+          <a:stretch/>
+        </p:blipFill>
+        <p:spPr>
+          <a:xfrm>
+            <a:off x="640080" y="2020711"/>
+            <a:ext cx="2272453" cy="2511535"/>
+          </a:xfrm>
+          <a:prstGeom prst="rect">
+            <a:avLst/>
+          </a:prstGeom>
+        </p:spPr>
+      </p:pic>
+      <p:sp>
+        <p:nvSpPr>
+          <p:cNvPr id="13" name="Rectangle 12">
+            <a:extLst>
+              <a:ext uri="{FF2B5EF4-FFF2-40B4-BE49-F238E27FC236}">
+                <a16:creationId xmlns:a16="http://schemas.microsoft.com/office/drawing/2014/main" id="{D7A51F48-EDCF-4FB8-8122-DB38C94C2B86}"/>
+              </a:ext>
+            </a:extLst>
+          </p:cNvPr>
+          <p:cNvSpPr/>
+          <p:nvPr/>
+        </p:nvSpPr>
+        <p:spPr>
+          <a:xfrm>
+            <a:off x="354564" y="4288100"/>
+            <a:ext cx="3587073" cy="952257"/>
+          </a:xfrm>
+          <a:prstGeom prst="rect">
+            <a:avLst/>
+          </a:prstGeom>
+          <a:noFill/>
+        </p:spPr>
+        <p:txBody>
+          <a:bodyPr wrap="none" lIns="91440" tIns="45720" rIns="91440" bIns="45720">
+            <a:prstTxWarp prst="textArchDown">
+              <a:avLst>
+                <a:gd name="adj" fmla="val 526117"/>
+              </a:avLst>
+            </a:prstTxWarp>
+            <a:spAutoFit/>
+          </a:bodyPr>
+          <a:lstStyle/>
+          <a:p>
+            <a:pPr algn="ctr"/>
+            <a:r>
+              <a:rPr lang="en-US" sz="5400" b="0" cap="none" spc="0" dirty="0">
+                <a:ln w="0"/>
+                <a:solidFill>
+                  <a:schemeClr val="tx1"/>
+                </a:solidFill>
+                <a:effectLst>
+                  <a:outerShdw blurRad="38100" dist="19050" dir="2700000" algn="tl" rotWithShape="0">
+                    <a:schemeClr val="dk1">
+                      <a:alpha val="40000"/>
+                    </a:schemeClr>
+                  </a:outerShdw>
+                </a:effectLst>
+              </a:rPr>
+              <a:t>Pandas for Dynamo</a:t>
+            </a:r>
+          </a:p>
+        </p:txBody>
+      </p:sp>
+      <p:sp>
+        <p:nvSpPr>
+          <p:cNvPr id="14" name="TextBox 13">
+            <a:extLst>
+              <a:ext uri="{FF2B5EF4-FFF2-40B4-BE49-F238E27FC236}">
+                <a16:creationId xmlns:a16="http://schemas.microsoft.com/office/drawing/2014/main" id="{069505C8-83C4-4059-AA9C-916369221D61}"/>
+              </a:ext>
+            </a:extLst>
+          </p:cNvPr>
+          <p:cNvSpPr txBox="1"/>
+          <p:nvPr/>
+        </p:nvSpPr>
+        <p:spPr>
+          <a:xfrm>
+            <a:off x="6972069" y="4917191"/>
+            <a:ext cx="4833258" cy="646331"/>
+          </a:xfrm>
+          <a:prstGeom prst="rect">
+            <a:avLst/>
+          </a:prstGeom>
+          <a:noFill/>
+        </p:spPr>
+        <p:txBody>
+          <a:bodyPr wrap="square" rtlCol="0">
+            <a:spAutoFit/>
+          </a:bodyPr>
+          <a:lstStyle/>
+          <a:p>
+            <a:r>
+              <a:rPr lang="en-US" dirty="0"/>
+              <a:t>49 nodes – broken down by 10 categories</a:t>
+            </a:r>
+          </a:p>
+          <a:p>
+            <a:r>
+              <a:rPr lang="en-US" dirty="0"/>
+              <a:t>1 view extension to connect Dynamo with Python</a:t>
+            </a:r>
+            <a:endParaRPr lang="en-GB" dirty="0"/>
+          </a:p>
+        </p:txBody>
+      </p:sp>
+      <p:sp>
+        <p:nvSpPr>
+          <p:cNvPr id="3" name="Rectangle 2">
+            <a:extLst>
+              <a:ext uri="{FF2B5EF4-FFF2-40B4-BE49-F238E27FC236}">
+                <a16:creationId xmlns:a16="http://schemas.microsoft.com/office/drawing/2014/main" id="{DC4CF84B-7777-4F7E-BF84-DD4470D296FC}"/>
+              </a:ext>
+            </a:extLst>
+          </p:cNvPr>
+          <p:cNvSpPr/>
+          <p:nvPr/>
+        </p:nvSpPr>
+        <p:spPr>
+          <a:xfrm>
+            <a:off x="-409713" y="1772266"/>
+            <a:ext cx="4846539" cy="952256"/>
+          </a:xfrm>
+          <a:prstGeom prst="rect">
+            <a:avLst/>
+          </a:prstGeom>
+          <a:noFill/>
+        </p:spPr>
+        <p:txBody>
+          <a:bodyPr wrap="none" lIns="91440" tIns="45720" rIns="91440" bIns="45720">
+            <a:prstTxWarp prst="textArchUp">
+              <a:avLst>
+                <a:gd name="adj" fmla="val 9197872"/>
+              </a:avLst>
+            </a:prstTxWarp>
+            <a:spAutoFit/>
+          </a:bodyPr>
+          <a:lstStyle/>
+          <a:p>
+            <a:pPr algn="ctr"/>
+            <a:r>
+              <a:rPr lang="en-US" sz="5400" b="0" cap="none" spc="0" dirty="0" err="1">
+                <a:ln w="0"/>
+                <a:solidFill>
+                  <a:schemeClr val="tx1"/>
+                </a:solidFill>
+                <a:effectLst>
+                  <a:outerShdw blurRad="38100" dist="19050" dir="2700000" algn="tl" rotWithShape="0">
+                    <a:schemeClr val="dk1">
+                      <a:alpha val="40000"/>
+                    </a:schemeClr>
+                  </a:outerShdw>
+                </a:effectLst>
+              </a:rPr>
+              <a:t>Pandamo</a:t>
+            </a:r>
+            <a:endParaRPr lang="en-US" sz="5400" b="0" cap="none" spc="0" dirty="0">
+              <a:ln w="0"/>
+              <a:solidFill>
+                <a:schemeClr val="tx1"/>
+              </a:solidFill>
+              <a:effectLst>
+                <a:outerShdw blurRad="38100" dist="19050" dir="2700000" algn="tl" rotWithShape="0">
+                  <a:schemeClr val="dk1">
+                    <a:alpha val="40000"/>
+                  </a:schemeClr>
+                </a:outerShdw>
+              </a:effectLst>
+            </a:endParaRPr>
+          </a:p>
+        </p:txBody>
+      </p:sp>
+    </p:spTree>
+    <p:extLst>
+      <p:ext uri="{BB962C8B-B14F-4D97-AF65-F5344CB8AC3E}">
+        <p14:creationId xmlns:p14="http://schemas.microsoft.com/office/powerpoint/2010/main" val="956590231"/>
+      </p:ext>
+    </p:extLst>
+  </p:cSld>
+  <p:clrMapOvr>
+    <a:masterClrMapping/>
+  </p:clrMapOvr>
+</p:sld>
+</file>
+
+<file path=ppt/slides/slide12.xml><?xml version="1.0" encoding="utf-8"?>
+<p:sld xmlns:a="http://schemas.openxmlformats.org/drawingml/2006/main" xmlns:r="http://schemas.openxmlformats.org/officeDocument/2006/relationships" xmlns:p="http://schemas.openxmlformats.org/presentationml/2006/main">
+  <p:cSld>
+    <p:spTree>
+      <p:nvGrpSpPr>
+        <p:cNvPr id="1" name=""/>
+        <p:cNvGrpSpPr/>
+        <p:nvPr/>
+      </p:nvGrpSpPr>
+      <p:grpSpPr>
+        <a:xfrm>
+          <a:off x="0" y="0"/>
+          <a:ext cx="0" cy="0"/>
+          <a:chOff x="0" y="0"/>
+          <a:chExt cx="0" cy="0"/>
+        </a:xfrm>
+      </p:grpSpPr>
+      <p:sp>
+        <p:nvSpPr>
+          <p:cNvPr id="2" name="Title 1">
+            <a:extLst>
+              <a:ext uri="{FF2B5EF4-FFF2-40B4-BE49-F238E27FC236}">
+                <a16:creationId xmlns:a16="http://schemas.microsoft.com/office/drawing/2014/main" id="{775F5984-700D-4974-AEBD-8F393A54F09E}"/>
+              </a:ext>
+            </a:extLst>
+          </p:cNvPr>
+          <p:cNvSpPr>
+            <a:spLocks noGrp="1"/>
+          </p:cNvSpPr>
+          <p:nvPr>
+            <p:ph type="title"/>
+          </p:nvPr>
+        </p:nvSpPr>
+        <p:spPr/>
+        <p:txBody>
+          <a:bodyPr/>
+          <a:lstStyle/>
+          <a:p>
+            <a:r>
+              <a:rPr lang="en-GB" b="1" dirty="0"/>
+              <a:t>The Tech</a:t>
+            </a:r>
+          </a:p>
+        </p:txBody>
+      </p:sp>
+      <p:pic>
+        <p:nvPicPr>
+          <p:cNvPr id="4" name="Content Placeholder 3" descr="Billedresultat for dynamobim logo">
+            <a:extLst>
+              <a:ext uri="{FF2B5EF4-FFF2-40B4-BE49-F238E27FC236}">
+                <a16:creationId xmlns:a16="http://schemas.microsoft.com/office/drawing/2014/main" id="{D2CB510A-5388-48FC-9AB1-571E482FDD72}"/>
               </a:ext>
             </a:extLst>
           </p:cNvPr>
@@ -4171,7 +4603,7 @@
             <p:ph idx="1"/>
           </p:nvPr>
         </p:nvPicPr>
-        <p:blipFill rotWithShape="1">
+        <p:blipFill>
           <a:blip r:embed="rId2">
             <a:extLst>
               <a:ext uri="{28A0092B-C50C-407E-A947-70E740481C1C}">
@@ -4179,13 +4611,15 @@
               </a:ext>
             </a:extLst>
           </a:blip>
-          <a:srcRect l="16178" t="17170" r="15536" b="8867"/>
-          <a:stretch/>
+          <a:srcRect/>
+          <a:stretch>
+            <a:fillRect/>
+          </a:stretch>
         </p:blipFill>
         <p:spPr bwMode="auto">
           <a:xfrm>
-            <a:off x="8487748" y="969899"/>
-            <a:ext cx="3425609" cy="2782799"/>
+            <a:off x="1051079" y="1690688"/>
+            <a:ext cx="1452092" cy="1826116"/>
           </a:xfrm>
           <a:prstGeom prst="rect">
             <a:avLst/>
@@ -4202,41 +4636,129 @@
           </a:extLst>
         </p:spPr>
       </p:pic>
+      <p:pic>
+        <p:nvPicPr>
+          <p:cNvPr id="5" name="Picture 6" descr="Billedresultat for python 3.7 logo">
+            <a:extLst>
+              <a:ext uri="{FF2B5EF4-FFF2-40B4-BE49-F238E27FC236}">
+                <a16:creationId xmlns:a16="http://schemas.microsoft.com/office/drawing/2014/main" id="{A7B47D9E-4537-4162-9F8C-2A15E0FA26C4}"/>
+              </a:ext>
+            </a:extLst>
+          </p:cNvPr>
+          <p:cNvPicPr>
+            <a:picLocks noChangeAspect="1" noChangeArrowheads="1"/>
+          </p:cNvPicPr>
+          <p:nvPr/>
+        </p:nvPicPr>
+        <p:blipFill>
+          <a:blip r:embed="rId3">
+            <a:extLst>
+              <a:ext uri="{28A0092B-C50C-407E-A947-70E740481C1C}">
+                <a14:useLocalDpi xmlns:a14="http://schemas.microsoft.com/office/drawing/2010/main" val="0"/>
+              </a:ext>
+            </a:extLst>
+          </a:blip>
+          <a:srcRect/>
+          <a:stretch>
+            <a:fillRect/>
+          </a:stretch>
+        </p:blipFill>
+        <p:spPr bwMode="auto">
+          <a:xfrm>
+            <a:off x="7219643" y="2979837"/>
+            <a:ext cx="4712301" cy="1591676"/>
+          </a:xfrm>
+          <a:prstGeom prst="rect">
+            <a:avLst/>
+          </a:prstGeom>
+          <a:noFill/>
+          <a:extLst>
+            <a:ext uri="{909E8E84-426E-40DD-AFC4-6F175D3DCCD1}">
+              <a14:hiddenFill xmlns:a14="http://schemas.microsoft.com/office/drawing/2010/main">
+                <a:solidFill>
+                  <a:srgbClr val="FFFFFF"/>
+                </a:solidFill>
+              </a14:hiddenFill>
+            </a:ext>
+          </a:extLst>
+        </p:spPr>
+      </p:pic>
+      <p:pic>
+        <p:nvPicPr>
+          <p:cNvPr id="6" name="Picture 2" descr="Billedresultat for Flask python">
+            <a:extLst>
+              <a:ext uri="{FF2B5EF4-FFF2-40B4-BE49-F238E27FC236}">
+                <a16:creationId xmlns:a16="http://schemas.microsoft.com/office/drawing/2014/main" id="{7C1A327C-4E60-4A55-8E0D-9ACF5B58648C}"/>
+              </a:ext>
+            </a:extLst>
+          </p:cNvPr>
+          <p:cNvPicPr>
+            <a:picLocks noChangeAspect="1" noChangeArrowheads="1"/>
+          </p:cNvPicPr>
+          <p:nvPr/>
+        </p:nvPicPr>
+        <p:blipFill>
+          <a:blip r:embed="rId4">
+            <a:extLst>
+              <a:ext uri="{28A0092B-C50C-407E-A947-70E740481C1C}">
+                <a14:useLocalDpi xmlns:a14="http://schemas.microsoft.com/office/drawing/2010/main" val="0"/>
+              </a:ext>
+            </a:extLst>
+          </a:blip>
+          <a:srcRect/>
+          <a:stretch>
+            <a:fillRect/>
+          </a:stretch>
+        </p:blipFill>
+        <p:spPr bwMode="auto">
+          <a:xfrm>
+            <a:off x="4831812" y="5496488"/>
+            <a:ext cx="2300571" cy="901057"/>
+          </a:xfrm>
+          <a:prstGeom prst="rect">
+            <a:avLst/>
+          </a:prstGeom>
+          <a:noFill/>
+          <a:extLst>
+            <a:ext uri="{909E8E84-426E-40DD-AFC4-6F175D3DCCD1}">
+              <a14:hiddenFill xmlns:a14="http://schemas.microsoft.com/office/drawing/2010/main">
+                <a:solidFill>
+                  <a:srgbClr val="FFFFFF"/>
+                </a:solidFill>
+              </a14:hiddenFill>
+            </a:ext>
+          </a:extLst>
+        </p:spPr>
+      </p:pic>
       <p:cxnSp>
         <p:nvCxnSpPr>
-          <p:cNvPr id="75" name="Straight Connector 74">
-            <a:extLst>
-              <a:ext uri="{FF2B5EF4-FFF2-40B4-BE49-F238E27FC236}">
-                <a16:creationId xmlns:a16="http://schemas.microsoft.com/office/drawing/2014/main" id="{818DC98F-4057-4645-B948-F604F39A9CFE}"/>
-              </a:ext>
-              <a:ext uri="{C183D7F6-B498-43B3-948B-1728B52AA6E4}">
-                <adec:decorative xmlns:adec="http://schemas.microsoft.com/office/drawing/2017/decorative" val="1"/>
+          <p:cNvPr id="10" name="Connector: Elbow 9">
+            <a:extLst>
+              <a:ext uri="{FF2B5EF4-FFF2-40B4-BE49-F238E27FC236}">
+                <a16:creationId xmlns:a16="http://schemas.microsoft.com/office/drawing/2014/main" id="{89A2F261-8A36-415C-97AD-3F75D7206B32}"/>
               </a:ext>
             </a:extLst>
           </p:cNvPr>
           <p:cNvCxnSpPr>
-            <a:cxnSpLocks noGrp="1" noRot="1" noChangeAspect="1" noMove="1" noResize="1" noEditPoints="1" noAdjustHandles="1" noChangeArrowheads="1" noChangeShapeType="1"/>
+            <a:stCxn id="6" idx="3"/>
+            <a:endCxn id="5" idx="2"/>
           </p:cNvCxnSpPr>
-          <p:nvPr>
-            <p:extLst>
-              <p:ext uri="{386F3935-93C4-4BCD-93E2-E3B085C9AB24}">
-                <p16:designElem xmlns:p16="http://schemas.microsoft.com/office/powerpoint/2015/main" val="1"/>
-              </p:ext>
-            </p:extLst>
-          </p:nvPr>
+          <p:nvPr/>
         </p:nvCxnSpPr>
         <p:spPr>
-          <a:xfrm>
-            <a:off x="8153400" y="477749"/>
-            <a:ext cx="0" cy="3657600"/>
-          </a:xfrm>
-          <a:prstGeom prst="line">
+          <a:xfrm flipV="1">
+            <a:off x="7132383" y="4571513"/>
+            <a:ext cx="2443411" cy="1375504"/>
+          </a:xfrm>
+          <a:prstGeom prst="bentConnector2">
             <a:avLst/>
           </a:prstGeom>
-          <a:ln w="101600" cmpd="dbl">
+          <a:ln w="57150">
             <a:solidFill>
-              <a:srgbClr val="595959"/>
+              <a:schemeClr val="tx1"/>
             </a:solidFill>
+            <a:prstDash val="lgDash"/>
+            <a:headEnd type="stealth"/>
           </a:ln>
         </p:spPr>
         <p:style>
@@ -4256,75 +4778,126 @@
       </p:cxnSp>
       <p:pic>
         <p:nvPicPr>
-          <p:cNvPr id="5" name="Picture 4" descr="A screenshot of a cell phone&#10;&#10;Description automatically generated">
-            <a:extLst>
-              <a:ext uri="{FF2B5EF4-FFF2-40B4-BE49-F238E27FC236}">
-                <a16:creationId xmlns:a16="http://schemas.microsoft.com/office/drawing/2014/main" id="{C39D0EE0-8FDE-451C-8BB2-F2FF97C243F0}"/>
+          <p:cNvPr id="11" name="Picture 2" descr="Billedresultat for python data science">
+            <a:extLst>
+              <a:ext uri="{FF2B5EF4-FFF2-40B4-BE49-F238E27FC236}">
+                <a16:creationId xmlns:a16="http://schemas.microsoft.com/office/drawing/2014/main" id="{77A4605F-0E08-42B3-931B-7FB705650AFF}"/>
               </a:ext>
             </a:extLst>
           </p:cNvPr>
           <p:cNvPicPr>
-            <a:picLocks noChangeAspect="1"/>
+            <a:picLocks noChangeAspect="1" noChangeArrowheads="1"/>
           </p:cNvPicPr>
           <p:nvPr/>
         </p:nvPicPr>
-        <p:blipFill>
-          <a:blip r:embed="rId3">
+        <p:blipFill rotWithShape="1">
+          <a:blip r:embed="rId5">
             <a:extLst>
               <a:ext uri="{28A0092B-C50C-407E-A947-70E740481C1C}">
                 <a14:useLocalDpi xmlns:a14="http://schemas.microsoft.com/office/drawing/2010/main" val="0"/>
               </a:ext>
             </a:extLst>
           </a:blip>
-          <a:stretch>
-            <a:fillRect/>
-          </a:stretch>
+          <a:srcRect t="60579" r="59902" b="11962"/>
+          <a:stretch/>
         </p:blipFill>
-        <p:spPr>
+        <p:spPr bwMode="auto">
           <a:xfrm>
-            <a:off x="357323" y="587250"/>
-            <a:ext cx="3423916" cy="3548099"/>
+            <a:off x="8616447" y="2529309"/>
+            <a:ext cx="3210289" cy="923330"/>
           </a:xfrm>
           <a:prstGeom prst="rect">
             <a:avLst/>
           </a:prstGeom>
+          <a:noFill/>
+          <a:extLst>
+            <a:ext uri="{909E8E84-426E-40DD-AFC4-6F175D3DCCD1}">
+              <a14:hiddenFill xmlns:a14="http://schemas.microsoft.com/office/drawing/2010/main">
+                <a:solidFill>
+                  <a:srgbClr val="FFFFFF"/>
+                </a:solidFill>
+              </a14:hiddenFill>
+            </a:ext>
+          </a:extLst>
         </p:spPr>
       </p:pic>
+      <p:sp>
+        <p:nvSpPr>
+          <p:cNvPr id="12" name="Rectangle 11">
+            <a:extLst>
+              <a:ext uri="{FF2B5EF4-FFF2-40B4-BE49-F238E27FC236}">
+                <a16:creationId xmlns:a16="http://schemas.microsoft.com/office/drawing/2014/main" id="{14191F74-D69B-4523-86B7-0D1CB2FFF7B6}"/>
+              </a:ext>
+            </a:extLst>
+          </p:cNvPr>
+          <p:cNvSpPr/>
+          <p:nvPr/>
+        </p:nvSpPr>
+        <p:spPr>
+          <a:xfrm>
+            <a:off x="5137520" y="1575202"/>
+            <a:ext cx="1689153" cy="954107"/>
+          </a:xfrm>
+          <a:prstGeom prst="rect">
+            <a:avLst/>
+          </a:prstGeom>
+          <a:noFill/>
+        </p:spPr>
+        <p:txBody>
+          <a:bodyPr wrap="square" lIns="91440" tIns="45720" rIns="91440" bIns="45720">
+            <a:spAutoFit/>
+          </a:bodyPr>
+          <a:lstStyle/>
+          <a:p>
+            <a:pPr algn="ctr"/>
+            <a:r>
+              <a:rPr lang="en-US" sz="2800" b="0" cap="none" spc="0" dirty="0">
+                <a:ln w="0"/>
+                <a:solidFill>
+                  <a:schemeClr val="tx1"/>
+                </a:solidFill>
+                <a:effectLst>
+                  <a:outerShdw blurRad="38100" dist="19050" dir="2700000" algn="tl" rotWithShape="0">
+                    <a:schemeClr val="dk1">
+                      <a:alpha val="40000"/>
+                    </a:schemeClr>
+                  </a:outerShdw>
+                </a:effectLst>
+              </a:rPr>
+              <a:t>View Extension</a:t>
+            </a:r>
+          </a:p>
+        </p:txBody>
+      </p:sp>
       <p:cxnSp>
         <p:nvCxnSpPr>
-          <p:cNvPr id="77" name="Straight Connector 76">
-            <a:extLst>
-              <a:ext uri="{FF2B5EF4-FFF2-40B4-BE49-F238E27FC236}">
-                <a16:creationId xmlns:a16="http://schemas.microsoft.com/office/drawing/2014/main" id="{DAD2B705-4A9B-408D-AA80-4F41045E09DE}"/>
-              </a:ext>
-              <a:ext uri="{C183D7F6-B498-43B3-948B-1728B52AA6E4}">
-                <adec:decorative xmlns:adec="http://schemas.microsoft.com/office/drawing/2017/decorative" val="1"/>
+          <p:cNvPr id="14" name="Straight Arrow Connector 13">
+            <a:extLst>
+              <a:ext uri="{FF2B5EF4-FFF2-40B4-BE49-F238E27FC236}">
+                <a16:creationId xmlns:a16="http://schemas.microsoft.com/office/drawing/2014/main" id="{E95515A8-7122-4D20-B1DF-7FEE990FEFBA}"/>
               </a:ext>
             </a:extLst>
           </p:cNvPr>
           <p:cNvCxnSpPr>
-            <a:cxnSpLocks noGrp="1" noRot="1" noChangeAspect="1" noMove="1" noResize="1" noEditPoints="1" noAdjustHandles="1" noChangeArrowheads="1" noChangeShapeType="1"/>
+            <a:stCxn id="12" idx="2"/>
+            <a:endCxn id="6" idx="0"/>
           </p:cNvCxnSpPr>
-          <p:nvPr>
-            <p:extLst>
-              <p:ext uri="{386F3935-93C4-4BCD-93E2-E3B085C9AB24}">
-                <p16:designElem xmlns:p16="http://schemas.microsoft.com/office/powerpoint/2015/main" val="1"/>
-              </p:ext>
-            </p:extLst>
-          </p:nvPr>
+          <p:nvPr/>
         </p:nvCxnSpPr>
         <p:spPr>
           <a:xfrm>
-            <a:off x="2209800" y="5738691"/>
-            <a:ext cx="7772400" cy="0"/>
-          </a:xfrm>
-          <a:prstGeom prst="line">
+            <a:off x="5982097" y="2529309"/>
+            <a:ext cx="1" cy="2967179"/>
+          </a:xfrm>
+          <a:prstGeom prst="straightConnector1">
             <a:avLst/>
           </a:prstGeom>
-          <a:ln w="22225">
+          <a:ln w="57150">
             <a:solidFill>
-              <a:srgbClr val="D9D9D9"/>
+              <a:schemeClr val="tx1"/>
             </a:solidFill>
+            <a:prstDash val="lgDash"/>
+            <a:tailEnd type="triangle"/>
           </a:ln>
         </p:spPr>
         <p:style>
@@ -4342,62 +4915,84 @@
           </a:fontRef>
         </p:style>
       </p:cxnSp>
-      <p:pic>
-        <p:nvPicPr>
-          <p:cNvPr id="8" name="Picture 7">
-            <a:extLst>
-              <a:ext uri="{FF2B5EF4-FFF2-40B4-BE49-F238E27FC236}">
-                <a16:creationId xmlns:a16="http://schemas.microsoft.com/office/drawing/2014/main" id="{4AC35D0C-7753-4B18-B689-D92E33928239}"/>
-              </a:ext>
-            </a:extLst>
-          </p:cNvPr>
-          <p:cNvPicPr>
-            <a:picLocks noChangeAspect="1"/>
-          </p:cNvPicPr>
+      <p:sp>
+        <p:nvSpPr>
+          <p:cNvPr id="15" name="Rectangle 14">
+            <a:extLst>
+              <a:ext uri="{FF2B5EF4-FFF2-40B4-BE49-F238E27FC236}">
+                <a16:creationId xmlns:a16="http://schemas.microsoft.com/office/drawing/2014/main" id="{6BC467D8-9729-458C-9C78-4C2F57B7EF54}"/>
+              </a:ext>
+            </a:extLst>
+          </p:cNvPr>
+          <p:cNvSpPr/>
           <p:nvPr/>
-        </p:nvPicPr>
-        <p:blipFill>
-          <a:blip r:embed="rId4"/>
-          <a:stretch>
-            <a:fillRect/>
-          </a:stretch>
-        </p:blipFill>
+        </p:nvSpPr>
         <p:spPr>
           <a:xfrm>
-            <a:off x="4350140" y="1086199"/>
-            <a:ext cx="3585920" cy="2342801"/>
+            <a:off x="838200" y="5469963"/>
+            <a:ext cx="1877514" cy="954107"/>
           </a:xfrm>
           <a:prstGeom prst="rect">
             <a:avLst/>
           </a:prstGeom>
-        </p:spPr>
-      </p:pic>
+          <a:noFill/>
+        </p:spPr>
+        <p:txBody>
+          <a:bodyPr wrap="square" lIns="91440" tIns="45720" rIns="91440" bIns="45720">
+            <a:spAutoFit/>
+          </a:bodyPr>
+          <a:lstStyle/>
+          <a:p>
+            <a:pPr algn="ctr"/>
+            <a:r>
+              <a:rPr lang="en-US" sz="2800" b="0" cap="none" spc="0" dirty="0">
+                <a:ln w="0"/>
+                <a:solidFill>
+                  <a:schemeClr val="tx1"/>
+                </a:solidFill>
+                <a:effectLst>
+                  <a:outerShdw blurRad="38100" dist="19050" dir="2700000" algn="tl" rotWithShape="0">
+                    <a:schemeClr val="dk1">
+                      <a:alpha val="40000"/>
+                    </a:schemeClr>
+                  </a:outerShdw>
+                </a:effectLst>
+              </a:rPr>
+              <a:t>Zero-Touch Nodes</a:t>
+            </a:r>
+          </a:p>
+        </p:txBody>
+      </p:sp>
       <p:cxnSp>
         <p:nvCxnSpPr>
-          <p:cNvPr id="10" name="Straight Connector 9">
-            <a:extLst>
-              <a:ext uri="{FF2B5EF4-FFF2-40B4-BE49-F238E27FC236}">
-                <a16:creationId xmlns:a16="http://schemas.microsoft.com/office/drawing/2014/main" id="{6A93249A-C510-404B-89C0-DA49D7114067}"/>
+          <p:cNvPr id="17" name="Straight Arrow Connector 16">
+            <a:extLst>
+              <a:ext uri="{FF2B5EF4-FFF2-40B4-BE49-F238E27FC236}">
+                <a16:creationId xmlns:a16="http://schemas.microsoft.com/office/drawing/2014/main" id="{50BAF049-BE32-4C5F-BA7B-47BEF3ED42D4}"/>
               </a:ext>
             </a:extLst>
           </p:cNvPr>
           <p:cNvCxnSpPr>
-            <a:cxnSpLocks/>
+            <a:stCxn id="15" idx="3"/>
+            <a:endCxn id="6" idx="1"/>
           </p:cNvCxnSpPr>
           <p:nvPr/>
         </p:nvCxnSpPr>
         <p:spPr>
           <a:xfrm>
-            <a:off x="8991600" y="762000"/>
-            <a:ext cx="2921757" cy="2336800"/>
-          </a:xfrm>
-          <a:prstGeom prst="line">
+            <a:off x="2715714" y="5947017"/>
+            <a:ext cx="2116098" cy="0"/>
+          </a:xfrm>
+          <a:prstGeom prst="straightConnector1">
             <a:avLst/>
           </a:prstGeom>
-          <a:ln w="38100">
+          <a:ln w="57150">
             <a:solidFill>
-              <a:srgbClr val="FF0000"/>
+              <a:schemeClr val="tx1"/>
             </a:solidFill>
+            <a:prstDash val="lgDash"/>
+            <a:headEnd type="triangle"/>
+            <a:tailEnd type="triangle"/>
           </a:ln>
         </p:spPr>
         <p:style>
@@ -4417,30 +5012,81 @@
       </p:cxnSp>
       <p:cxnSp>
         <p:nvCxnSpPr>
-          <p:cNvPr id="12" name="Straight Connector 11">
-            <a:extLst>
-              <a:ext uri="{FF2B5EF4-FFF2-40B4-BE49-F238E27FC236}">
-                <a16:creationId xmlns:a16="http://schemas.microsoft.com/office/drawing/2014/main" id="{FA73CE84-61E9-451D-BB18-1763C7E030B7}"/>
+          <p:cNvPr id="19" name="Connector: Elbow 18">
+            <a:extLst>
+              <a:ext uri="{FF2B5EF4-FFF2-40B4-BE49-F238E27FC236}">
+                <a16:creationId xmlns:a16="http://schemas.microsoft.com/office/drawing/2014/main" id="{CA48455A-1E02-4439-BAC0-DE7489332155}"/>
+              </a:ext>
+            </a:extLst>
+          </p:cNvPr>
+          <p:cNvCxnSpPr>
+            <a:stCxn id="4" idx="3"/>
+            <a:endCxn id="12" idx="1"/>
+          </p:cNvCxnSpPr>
+          <p:nvPr/>
+        </p:nvCxnSpPr>
+        <p:spPr>
+          <a:xfrm flipV="1">
+            <a:off x="2503171" y="2052256"/>
+            <a:ext cx="2634349" cy="551490"/>
+          </a:xfrm>
+          <a:prstGeom prst="bentConnector3">
+            <a:avLst/>
+          </a:prstGeom>
+          <a:ln w="57150">
+            <a:solidFill>
+              <a:schemeClr val="tx1"/>
+            </a:solidFill>
+            <a:prstDash val="lgDash"/>
+            <a:tailEnd type="triangle"/>
+          </a:ln>
+        </p:spPr>
+        <p:style>
+          <a:lnRef idx="1">
+            <a:schemeClr val="accent1"/>
+          </a:lnRef>
+          <a:fillRef idx="0">
+            <a:schemeClr val="accent1"/>
+          </a:fillRef>
+          <a:effectRef idx="0">
+            <a:schemeClr val="accent1"/>
+          </a:effectRef>
+          <a:fontRef idx="minor">
+            <a:schemeClr val="tx1"/>
+          </a:fontRef>
+        </p:style>
+      </p:cxnSp>
+      <p:cxnSp>
+        <p:nvCxnSpPr>
+          <p:cNvPr id="24" name="Straight Arrow Connector 23">
+            <a:extLst>
+              <a:ext uri="{FF2B5EF4-FFF2-40B4-BE49-F238E27FC236}">
+                <a16:creationId xmlns:a16="http://schemas.microsoft.com/office/drawing/2014/main" id="{1FB233F7-E760-4EB3-B193-1459A70A9BA2}"/>
               </a:ext>
             </a:extLst>
           </p:cNvPr>
           <p:cNvCxnSpPr>
             <a:cxnSpLocks/>
+            <a:stCxn id="4" idx="2"/>
+            <a:endCxn id="15" idx="0"/>
           </p:cNvCxnSpPr>
           <p:nvPr/>
         </p:nvCxnSpPr>
         <p:spPr>
           <a:xfrm flipH="1">
-            <a:off x="8991600" y="800100"/>
-            <a:ext cx="2921757" cy="2224622"/>
-          </a:xfrm>
-          <a:prstGeom prst="line">
+            <a:off x="1776957" y="3516804"/>
+            <a:ext cx="168" cy="1953159"/>
+          </a:xfrm>
+          <a:prstGeom prst="straightConnector1">
             <a:avLst/>
           </a:prstGeom>
-          <a:ln w="38100">
+          <a:ln w="57150">
             <a:solidFill>
-              <a:srgbClr val="FF0000"/>
+              <a:schemeClr val="tx1"/>
             </a:solidFill>
+            <a:prstDash val="lgDash"/>
+            <a:headEnd type="triangle"/>
+            <a:tailEnd type="triangle"/>
           </a:ln>
         </p:spPr>
         <p:style>
@@ -4461,511 +5107,7 @@
     </p:spTree>
     <p:extLst>
       <p:ext uri="{BB962C8B-B14F-4D97-AF65-F5344CB8AC3E}">
-        <p14:creationId xmlns:p14="http://schemas.microsoft.com/office/powerpoint/2010/main" val="631925738"/>
-      </p:ext>
-    </p:extLst>
-  </p:cSld>
-  <p:clrMapOvr>
-    <a:masterClrMapping/>
-  </p:clrMapOvr>
-</p:sld>
-</file>
-
-<file path=ppt/slides/slide12.xml><?xml version="1.0" encoding="utf-8"?>
-<p:sld xmlns:a="http://schemas.openxmlformats.org/drawingml/2006/main" xmlns:r="http://schemas.openxmlformats.org/officeDocument/2006/relationships" xmlns:p="http://schemas.openxmlformats.org/presentationml/2006/main">
-  <p:cSld>
-    <p:bg>
-      <p:bgPr>
-        <a:solidFill>
-          <a:schemeClr val="bg1"/>
-        </a:solidFill>
-        <a:effectLst/>
-      </p:bgPr>
-    </p:bg>
-    <p:spTree>
-      <p:nvGrpSpPr>
-        <p:cNvPr id="1" name=""/>
-        <p:cNvGrpSpPr/>
-        <p:nvPr/>
-      </p:nvGrpSpPr>
-      <p:grpSpPr>
-        <a:xfrm>
-          <a:off x="0" y="0"/>
-          <a:ext cx="0" cy="0"/>
-          <a:chOff x="0" y="0"/>
-          <a:chExt cx="0" cy="0"/>
-        </a:xfrm>
-      </p:grpSpPr>
-      <p:sp>
-        <p:nvSpPr>
-          <p:cNvPr id="71" name="Rectangle 70">
-            <a:extLst>
-              <a:ext uri="{FF2B5EF4-FFF2-40B4-BE49-F238E27FC236}">
-                <a16:creationId xmlns:a16="http://schemas.microsoft.com/office/drawing/2014/main" id="{6753252F-4873-4F63-801D-CC719279A7D5}"/>
-              </a:ext>
-              <a:ext uri="{C183D7F6-B498-43B3-948B-1728B52AA6E4}">
-                <adec:decorative xmlns:adec="http://schemas.microsoft.com/office/drawing/2017/decorative" val="1"/>
-              </a:ext>
-            </a:extLst>
-          </p:cNvPr>
-          <p:cNvSpPr>
-            <a:spLocks noGrp="1" noRot="1" noChangeAspect="1" noMove="1" noResize="1" noEditPoints="1" noAdjustHandles="1" noChangeArrowheads="1" noChangeShapeType="1" noTextEdit="1"/>
-          </p:cNvSpPr>
-          <p:nvPr>
-            <p:extLst>
-              <p:ext uri="{386F3935-93C4-4BCD-93E2-E3B085C9AB24}">
-                <p16:designElem xmlns:p16="http://schemas.microsoft.com/office/powerpoint/2015/main" val="1"/>
-              </p:ext>
-            </p:extLst>
-          </p:nvPr>
-        </p:nvSpPr>
-        <p:spPr>
-          <a:xfrm>
-            <a:off x="0" y="0"/>
-            <a:ext cx="12192000" cy="6858000"/>
-          </a:xfrm>
-          <a:prstGeom prst="rect">
-            <a:avLst/>
-          </a:prstGeom>
-          <a:solidFill>
-            <a:srgbClr val="FFFFFF"/>
-          </a:solidFill>
-          <a:ln>
-            <a:noFill/>
-          </a:ln>
-        </p:spPr>
-        <p:style>
-          <a:lnRef idx="2">
-            <a:schemeClr val="accent1">
-              <a:shade val="50000"/>
-            </a:schemeClr>
-          </a:lnRef>
-          <a:fillRef idx="1">
-            <a:schemeClr val="accent1"/>
-          </a:fillRef>
-          <a:effectRef idx="0">
-            <a:schemeClr val="accent1"/>
-          </a:effectRef>
-          <a:fontRef idx="minor">
-            <a:schemeClr val="lt1"/>
-          </a:fontRef>
-        </p:style>
-        <p:txBody>
-          <a:bodyPr rtlCol="0" anchor="ctr"/>
-          <a:lstStyle/>
-          <a:p>
-            <a:pPr algn="ctr"/>
-            <a:endParaRPr lang="en-US"/>
-          </a:p>
-        </p:txBody>
-      </p:sp>
-      <p:sp>
-        <p:nvSpPr>
-          <p:cNvPr id="73" name="Rectangle 72">
-            <a:extLst>
-              <a:ext uri="{FF2B5EF4-FFF2-40B4-BE49-F238E27FC236}">
-                <a16:creationId xmlns:a16="http://schemas.microsoft.com/office/drawing/2014/main" id="{047C8CCB-F95D-4249-92DD-651249D3535A}"/>
-              </a:ext>
-              <a:ext uri="{C183D7F6-B498-43B3-948B-1728B52AA6E4}">
-                <adec:decorative xmlns:adec="http://schemas.microsoft.com/office/drawing/2017/decorative" val="1"/>
-              </a:ext>
-            </a:extLst>
-          </p:cNvPr>
-          <p:cNvSpPr>
-            <a:spLocks noGrp="1" noRot="1" noChangeAspect="1" noMove="1" noResize="1" noEditPoints="1" noAdjustHandles="1" noChangeArrowheads="1" noChangeShapeType="1" noTextEdit="1"/>
-          </p:cNvSpPr>
-          <p:nvPr>
-            <p:extLst>
-              <p:ext uri="{386F3935-93C4-4BCD-93E2-E3B085C9AB24}">
-                <p16:designElem xmlns:p16="http://schemas.microsoft.com/office/powerpoint/2015/main" val="1"/>
-              </p:ext>
-            </p:extLst>
-          </p:nvPr>
-        </p:nvSpPr>
-        <p:spPr>
-          <a:xfrm>
-            <a:off x="0" y="0"/>
-            <a:ext cx="2013557" cy="6858000"/>
-          </a:xfrm>
-          <a:prstGeom prst="rect">
-            <a:avLst/>
-          </a:prstGeom>
-          <a:solidFill>
-            <a:srgbClr val="41435D"/>
-          </a:solidFill>
-          <a:ln>
-            <a:noFill/>
-          </a:ln>
-        </p:spPr>
-        <p:style>
-          <a:lnRef idx="2">
-            <a:schemeClr val="accent1">
-              <a:shade val="50000"/>
-            </a:schemeClr>
-          </a:lnRef>
-          <a:fillRef idx="1">
-            <a:schemeClr val="accent1"/>
-          </a:fillRef>
-          <a:effectRef idx="0">
-            <a:schemeClr val="accent1"/>
-          </a:effectRef>
-          <a:fontRef idx="minor">
-            <a:schemeClr val="lt1"/>
-          </a:fontRef>
-        </p:style>
-        <p:txBody>
-          <a:bodyPr rtlCol="0" anchor="ctr"/>
-          <a:lstStyle/>
-          <a:p>
-            <a:pPr algn="ctr"/>
-            <a:endParaRPr lang="en-US"/>
-          </a:p>
-        </p:txBody>
-      </p:sp>
-      <p:sp>
-        <p:nvSpPr>
-          <p:cNvPr id="2" name="Title 1">
-            <a:extLst>
-              <a:ext uri="{FF2B5EF4-FFF2-40B4-BE49-F238E27FC236}">
-                <a16:creationId xmlns:a16="http://schemas.microsoft.com/office/drawing/2014/main" id="{F7A2EE30-2105-44BA-B0B2-1DEE08D03444}"/>
-              </a:ext>
-            </a:extLst>
-          </p:cNvPr>
-          <p:cNvSpPr>
-            <a:spLocks noGrp="1"/>
-          </p:cNvSpPr>
-          <p:nvPr>
-            <p:ph type="title"/>
-          </p:nvPr>
-        </p:nvSpPr>
-        <p:spPr>
-          <a:xfrm>
-            <a:off x="640080" y="2074363"/>
-            <a:ext cx="2752354" cy="2709275"/>
-          </a:xfrm>
-          <a:prstGeom prst="ellipse">
-            <a:avLst/>
-          </a:prstGeom>
-          <a:solidFill>
-            <a:srgbClr val="262626"/>
-          </a:solidFill>
-          <a:ln w="174625" cmpd="thinThick">
-            <a:solidFill>
-              <a:srgbClr val="262626"/>
-            </a:solidFill>
-          </a:ln>
-        </p:spPr>
-        <p:txBody>
-          <a:bodyPr vert="horz" lIns="91440" tIns="45720" rIns="91440" bIns="45720" rtlCol="0" anchor="ctr">
-            <a:normAutofit/>
-          </a:bodyPr>
-          <a:lstStyle/>
-          <a:p>
-            <a:pPr algn="ctr"/>
-            <a:r>
-              <a:rPr lang="en-US" b="1" kern="1200" dirty="0">
-                <a:solidFill>
-                  <a:srgbClr val="FFFFFF"/>
-                </a:solidFill>
-                <a:latin typeface="+mj-lt"/>
-                <a:ea typeface="+mj-ea"/>
-                <a:cs typeface="+mj-cs"/>
-              </a:rPr>
-              <a:t>The Tech</a:t>
-            </a:r>
-          </a:p>
-        </p:txBody>
-      </p:sp>
-      <p:pic>
-        <p:nvPicPr>
-          <p:cNvPr id="6" name="Picture 8" descr="Billedresultat for dynamobim logo">
-            <a:extLst>
-              <a:ext uri="{FF2B5EF4-FFF2-40B4-BE49-F238E27FC236}">
-                <a16:creationId xmlns:a16="http://schemas.microsoft.com/office/drawing/2014/main" id="{3DFDF597-0AE7-41F0-B73D-9BD58510EED8}"/>
-              </a:ext>
-            </a:extLst>
-          </p:cNvPr>
-          <p:cNvPicPr>
-            <a:picLocks noGrp="1" noChangeAspect="1" noChangeArrowheads="1"/>
-          </p:cNvPicPr>
-          <p:nvPr>
-            <p:ph idx="1"/>
-          </p:nvPr>
-        </p:nvPicPr>
-        <p:blipFill>
-          <a:blip r:embed="rId2">
-            <a:extLst>
-              <a:ext uri="{28A0092B-C50C-407E-A947-70E740481C1C}">
-                <a14:useLocalDpi xmlns:a14="http://schemas.microsoft.com/office/drawing/2010/main" val="0"/>
-              </a:ext>
-            </a:extLst>
-          </a:blip>
-          <a:srcRect/>
-          <a:stretch>
-            <a:fillRect/>
-          </a:stretch>
-        </p:blipFill>
-        <p:spPr bwMode="auto">
-          <a:xfrm>
-            <a:off x="8663665" y="2229146"/>
-            <a:ext cx="1257300" cy="1581150"/>
-          </a:xfrm>
-          <a:prstGeom prst="rect">
-            <a:avLst/>
-          </a:prstGeom>
-          <a:noFill/>
-          <a:extLst>
-            <a:ext uri="{909E8E84-426E-40DD-AFC4-6F175D3DCCD1}">
-              <a14:hiddenFill xmlns:a14="http://schemas.microsoft.com/office/drawing/2010/main">
-                <a:solidFill>
-                  <a:srgbClr val="FFFFFF"/>
-                </a:solidFill>
-              </a14:hiddenFill>
-            </a:ext>
-          </a:extLst>
-        </p:spPr>
-      </p:pic>
-      <p:sp>
-        <p:nvSpPr>
-          <p:cNvPr id="7" name="Rectangle 6">
-            <a:extLst>
-              <a:ext uri="{FF2B5EF4-FFF2-40B4-BE49-F238E27FC236}">
-                <a16:creationId xmlns:a16="http://schemas.microsoft.com/office/drawing/2014/main" id="{350993C8-1F72-48C9-BF0A-199352D56315}"/>
-              </a:ext>
-            </a:extLst>
-          </p:cNvPr>
-          <p:cNvSpPr/>
-          <p:nvPr/>
-        </p:nvSpPr>
-        <p:spPr>
-          <a:xfrm>
-            <a:off x="9074258" y="3239391"/>
-            <a:ext cx="846707" cy="923330"/>
-          </a:xfrm>
-          <a:prstGeom prst="rect">
-            <a:avLst/>
-          </a:prstGeom>
-          <a:noFill/>
-        </p:spPr>
-        <p:txBody>
-          <a:bodyPr wrap="none" lIns="91440" tIns="45720" rIns="91440" bIns="45720">
-            <a:spAutoFit/>
-          </a:bodyPr>
-          <a:lstStyle/>
-          <a:p>
-            <a:pPr algn="ctr"/>
-            <a:r>
-              <a:rPr lang="en-US" sz="5400" b="0" cap="none" spc="0" dirty="0">
-                <a:ln w="0"/>
-                <a:solidFill>
-                  <a:schemeClr val="tx1"/>
-                </a:solidFill>
-                <a:effectLst>
-                  <a:outerShdw blurRad="38100" dist="19050" dir="2700000" algn="tl" rotWithShape="0">
-                    <a:schemeClr val="dk1">
-                      <a:alpha val="40000"/>
-                    </a:schemeClr>
-                  </a:outerShdw>
-                </a:effectLst>
-              </a:rPr>
-              <a:t>ZT</a:t>
-            </a:r>
-          </a:p>
-        </p:txBody>
-      </p:sp>
-      <p:pic>
-        <p:nvPicPr>
-          <p:cNvPr id="8" name="Picture 7" descr="Billedresultat for dynamobim logo">
-            <a:extLst>
-              <a:ext uri="{FF2B5EF4-FFF2-40B4-BE49-F238E27FC236}">
-                <a16:creationId xmlns:a16="http://schemas.microsoft.com/office/drawing/2014/main" id="{FD70F0D6-0415-4B9D-9B01-60B8C41310C0}"/>
-              </a:ext>
-            </a:extLst>
-          </p:cNvPr>
-          <p:cNvPicPr>
-            <a:picLocks noChangeAspect="1" noChangeArrowheads="1"/>
-          </p:cNvPicPr>
-          <p:nvPr/>
-        </p:nvPicPr>
-        <p:blipFill>
-          <a:blip r:embed="rId2">
-            <a:extLst>
-              <a:ext uri="{28A0092B-C50C-407E-A947-70E740481C1C}">
-                <a14:useLocalDpi xmlns:a14="http://schemas.microsoft.com/office/drawing/2010/main" val="0"/>
-              </a:ext>
-            </a:extLst>
-          </a:blip>
-          <a:srcRect/>
-          <a:stretch>
-            <a:fillRect/>
-          </a:stretch>
-        </p:blipFill>
-        <p:spPr bwMode="auto">
-          <a:xfrm>
-            <a:off x="10183750" y="903583"/>
-            <a:ext cx="1257300" cy="1581150"/>
-          </a:xfrm>
-          <a:prstGeom prst="rect">
-            <a:avLst/>
-          </a:prstGeom>
-          <a:noFill/>
-          <a:extLst>
-            <a:ext uri="{909E8E84-426E-40DD-AFC4-6F175D3DCCD1}">
-              <a14:hiddenFill xmlns:a14="http://schemas.microsoft.com/office/drawing/2010/main">
-                <a:solidFill>
-                  <a:srgbClr val="FFFFFF"/>
-                </a:solidFill>
-              </a14:hiddenFill>
-            </a:ext>
-          </a:extLst>
-        </p:spPr>
-      </p:pic>
-      <p:sp>
-        <p:nvSpPr>
-          <p:cNvPr id="9" name="Rectangle 8">
-            <a:extLst>
-              <a:ext uri="{FF2B5EF4-FFF2-40B4-BE49-F238E27FC236}">
-                <a16:creationId xmlns:a16="http://schemas.microsoft.com/office/drawing/2014/main" id="{95276249-C60E-413B-A63C-47C8B75D42EB}"/>
-              </a:ext>
-            </a:extLst>
-          </p:cNvPr>
-          <p:cNvSpPr/>
-          <p:nvPr/>
-        </p:nvSpPr>
-        <p:spPr>
-          <a:xfrm>
-            <a:off x="10559879" y="1913828"/>
-            <a:ext cx="915635" cy="923330"/>
-          </a:xfrm>
-          <a:prstGeom prst="rect">
-            <a:avLst/>
-          </a:prstGeom>
-          <a:noFill/>
-        </p:spPr>
-        <p:txBody>
-          <a:bodyPr wrap="none" lIns="91440" tIns="45720" rIns="91440" bIns="45720">
-            <a:spAutoFit/>
-          </a:bodyPr>
-          <a:lstStyle/>
-          <a:p>
-            <a:pPr algn="ctr"/>
-            <a:r>
-              <a:rPr lang="en-US" sz="5400" b="0" cap="none" spc="0" dirty="0">
-                <a:ln w="0"/>
-                <a:solidFill>
-                  <a:schemeClr val="tx1"/>
-                </a:solidFill>
-                <a:effectLst>
-                  <a:outerShdw blurRad="38100" dist="19050" dir="2700000" algn="tl" rotWithShape="0">
-                    <a:schemeClr val="dk1">
-                      <a:alpha val="40000"/>
-                    </a:schemeClr>
-                  </a:outerShdw>
-                </a:effectLst>
-              </a:rPr>
-              <a:t>VE</a:t>
-            </a:r>
-          </a:p>
-        </p:txBody>
-      </p:sp>
-      <p:pic>
-        <p:nvPicPr>
-          <p:cNvPr id="10" name="Picture 2" descr="Billedresultat for Flask python">
-            <a:extLst>
-              <a:ext uri="{FF2B5EF4-FFF2-40B4-BE49-F238E27FC236}">
-                <a16:creationId xmlns:a16="http://schemas.microsoft.com/office/drawing/2014/main" id="{BBF183DD-369F-4121-A4F4-E860B9D896D4}"/>
-              </a:ext>
-            </a:extLst>
-          </p:cNvPr>
-          <p:cNvPicPr>
-            <a:picLocks noChangeAspect="1" noChangeArrowheads="1"/>
-          </p:cNvPicPr>
-          <p:nvPr/>
-        </p:nvPicPr>
-        <p:blipFill>
-          <a:blip r:embed="rId3">
-            <a:extLst>
-              <a:ext uri="{28A0092B-C50C-407E-A947-70E740481C1C}">
-                <a14:useLocalDpi xmlns:a14="http://schemas.microsoft.com/office/drawing/2010/main" val="0"/>
-              </a:ext>
-            </a:extLst>
-          </a:blip>
-          <a:srcRect/>
-          <a:stretch>
-            <a:fillRect/>
-          </a:stretch>
-        </p:blipFill>
-        <p:spPr bwMode="auto">
-          <a:xfrm>
-            <a:off x="3717007" y="1499786"/>
-            <a:ext cx="3384416" cy="1325563"/>
-          </a:xfrm>
-          <a:prstGeom prst="rect">
-            <a:avLst/>
-          </a:prstGeom>
-          <a:noFill/>
-          <a:extLst>
-            <a:ext uri="{909E8E84-426E-40DD-AFC4-6F175D3DCCD1}">
-              <a14:hiddenFill xmlns:a14="http://schemas.microsoft.com/office/drawing/2010/main">
-                <a:solidFill>
-                  <a:srgbClr val="FFFFFF"/>
-                </a:solidFill>
-              </a14:hiddenFill>
-            </a:ext>
-          </a:extLst>
-        </p:spPr>
-      </p:pic>
-      <p:pic>
-        <p:nvPicPr>
-          <p:cNvPr id="11" name="Picture 6" descr="Billedresultat for python 3.7 logo">
-            <a:extLst>
-              <a:ext uri="{FF2B5EF4-FFF2-40B4-BE49-F238E27FC236}">
-                <a16:creationId xmlns:a16="http://schemas.microsoft.com/office/drawing/2014/main" id="{8384E0B2-B208-455C-87F6-B8402FAA5B77}"/>
-              </a:ext>
-            </a:extLst>
-          </p:cNvPr>
-          <p:cNvPicPr>
-            <a:picLocks noChangeAspect="1" noChangeArrowheads="1"/>
-          </p:cNvPicPr>
-          <p:nvPr/>
-        </p:nvPicPr>
-        <p:blipFill>
-          <a:blip r:embed="rId4">
-            <a:extLst>
-              <a:ext uri="{28A0092B-C50C-407E-A947-70E740481C1C}">
-                <a14:useLocalDpi xmlns:a14="http://schemas.microsoft.com/office/drawing/2010/main" val="0"/>
-              </a:ext>
-            </a:extLst>
-          </a:blip>
-          <a:srcRect/>
-          <a:stretch>
-            <a:fillRect/>
-          </a:stretch>
-        </p:blipFill>
-        <p:spPr bwMode="auto">
-          <a:xfrm>
-            <a:off x="3349733" y="4325135"/>
-            <a:ext cx="5724525" cy="1933575"/>
-          </a:xfrm>
-          <a:prstGeom prst="rect">
-            <a:avLst/>
-          </a:prstGeom>
-          <a:noFill/>
-          <a:extLst>
-            <a:ext uri="{909E8E84-426E-40DD-AFC4-6F175D3DCCD1}">
-              <a14:hiddenFill xmlns:a14="http://schemas.microsoft.com/office/drawing/2010/main">
-                <a:solidFill>
-                  <a:srgbClr val="FFFFFF"/>
-                </a:solidFill>
-              </a14:hiddenFill>
-            </a:ext>
-          </a:extLst>
-        </p:spPr>
-      </p:pic>
-    </p:spTree>
-    <p:extLst>
-      <p:ext uri="{BB962C8B-B14F-4D97-AF65-F5344CB8AC3E}">
-        <p14:creationId xmlns:p14="http://schemas.microsoft.com/office/powerpoint/2010/main" val="3532346012"/>
+        <p14:creationId xmlns:p14="http://schemas.microsoft.com/office/powerpoint/2010/main" val="853258109"/>
       </p:ext>
     </p:extLst>
   </p:cSld>

</xml_diff>